<commit_message>
Updated the view contents
</commit_message>
<xml_diff>
--- a/Proposal/LearnNow-Proposal.pptx
+++ b/Proposal/LearnNow-Proposal.pptx
@@ -5,16 +5,13 @@
     <p:sldMasterId id="2147483672" r:id="rId1"/>
   </p:sldMasterIdLst>
   <p:notesMasterIdLst>
-    <p:notesMasterId r:id="rId9"/>
+    <p:notesMasterId r:id="rId6"/>
   </p:notesMasterIdLst>
   <p:sldIdLst>
     <p:sldId id="256" r:id="rId2"/>
-    <p:sldId id="257" r:id="rId3"/>
-    <p:sldId id="258" r:id="rId4"/>
-    <p:sldId id="264" r:id="rId5"/>
-    <p:sldId id="260" r:id="rId6"/>
-    <p:sldId id="265" r:id="rId7"/>
-    <p:sldId id="262" r:id="rId8"/>
+    <p:sldId id="258" r:id="rId3"/>
+    <p:sldId id="264" r:id="rId4"/>
+    <p:sldId id="262" r:id="rId5"/>
   </p:sldIdLst>
   <p:sldSz cx="9144000" cy="6858000" type="screen4x3"/>
   <p:notesSz cx="6858000" cy="9144000"/>
@@ -199,7 +196,7 @@
             <a:fld id="{245812F8-1536-4FE2-B5B1-9C00C265A63D}" type="datetimeFigureOut">
               <a:rPr lang="en-US" smtClean="0"/>
               <a:pPr/>
-              <a:t>5/21/2020</a:t>
+              <a:t>5/26/2020</a:t>
             </a:fld>
             <a:endParaRPr lang="en-US"/>
           </a:p>
@@ -659,7 +656,7 @@
             <a:fld id="{5CB36C16-490A-4898-BFC6-ECF705FECB62}" type="datetimeFigureOut">
               <a:rPr lang="en-US" smtClean="0"/>
               <a:pPr/>
-              <a:t>5/21/2020</a:t>
+              <a:t>5/26/2020</a:t>
             </a:fld>
             <a:endParaRPr lang="en-US"/>
           </a:p>
@@ -897,7 +894,7 @@
             <a:fld id="{5CB36C16-490A-4898-BFC6-ECF705FECB62}" type="datetimeFigureOut">
               <a:rPr lang="en-US" smtClean="0"/>
               <a:pPr/>
-              <a:t>5/21/2020</a:t>
+              <a:t>5/26/2020</a:t>
             </a:fld>
             <a:endParaRPr lang="en-US"/>
           </a:p>
@@ -1084,7 +1081,7 @@
             <a:fld id="{5CB36C16-490A-4898-BFC6-ECF705FECB62}" type="datetimeFigureOut">
               <a:rPr lang="en-US" smtClean="0"/>
               <a:pPr/>
-              <a:t>5/21/2020</a:t>
+              <a:t>5/26/2020</a:t>
             </a:fld>
             <a:endParaRPr lang="en-US"/>
           </a:p>
@@ -1261,7 +1258,7 @@
             <a:fld id="{5CB36C16-490A-4898-BFC6-ECF705FECB62}" type="datetimeFigureOut">
               <a:rPr lang="en-US" smtClean="0"/>
               <a:pPr/>
-              <a:t>5/21/2020</a:t>
+              <a:t>5/26/2020</a:t>
             </a:fld>
             <a:endParaRPr lang="en-US"/>
           </a:p>
@@ -1517,7 +1514,7 @@
             <a:fld id="{5CB36C16-490A-4898-BFC6-ECF705FECB62}" type="datetimeFigureOut">
               <a:rPr lang="en-US" smtClean="0"/>
               <a:pPr/>
-              <a:t>5/21/2020</a:t>
+              <a:t>5/26/2020</a:t>
             </a:fld>
             <a:endParaRPr lang="en-US"/>
           </a:p>
@@ -1793,7 +1790,7 @@
             <a:fld id="{5CB36C16-490A-4898-BFC6-ECF705FECB62}" type="datetimeFigureOut">
               <a:rPr lang="en-US" smtClean="0"/>
               <a:pPr/>
-              <a:t>5/21/2020</a:t>
+              <a:t>5/26/2020</a:t>
             </a:fld>
             <a:endParaRPr lang="en-US"/>
           </a:p>
@@ -2179,7 +2176,7 @@
             <a:fld id="{5CB36C16-490A-4898-BFC6-ECF705FECB62}" type="datetimeFigureOut">
               <a:rPr lang="en-US" smtClean="0"/>
               <a:pPr/>
-              <a:t>5/21/2020</a:t>
+              <a:t>5/26/2020</a:t>
             </a:fld>
             <a:endParaRPr lang="en-US"/>
           </a:p>
@@ -2304,7 +2301,7 @@
             <a:fld id="{5CB36C16-490A-4898-BFC6-ECF705FECB62}" type="datetimeFigureOut">
               <a:rPr lang="en-US" smtClean="0"/>
               <a:pPr/>
-              <a:t>5/21/2020</a:t>
+              <a:t>5/26/2020</a:t>
             </a:fld>
             <a:endParaRPr lang="en-US"/>
           </a:p>
@@ -2406,7 +2403,7 @@
             <a:fld id="{5CB36C16-490A-4898-BFC6-ECF705FECB62}" type="datetimeFigureOut">
               <a:rPr lang="en-US" smtClean="0"/>
               <a:pPr/>
-              <a:t>5/21/2020</a:t>
+              <a:t>5/26/2020</a:t>
             </a:fld>
             <a:endParaRPr lang="en-US"/>
           </a:p>
@@ -2676,7 +2673,7 @@
             <a:fld id="{5CB36C16-490A-4898-BFC6-ECF705FECB62}" type="datetimeFigureOut">
               <a:rPr lang="en-US" smtClean="0"/>
               <a:pPr/>
-              <a:t>5/21/2020</a:t>
+              <a:t>5/26/2020</a:t>
             </a:fld>
             <a:endParaRPr lang="en-US"/>
           </a:p>
@@ -2952,7 +2949,7 @@
             <a:fld id="{5CB36C16-490A-4898-BFC6-ECF705FECB62}" type="datetimeFigureOut">
               <a:rPr lang="en-US" smtClean="0"/>
               <a:pPr/>
-              <a:t>5/21/2020</a:t>
+              <a:t>5/26/2020</a:t>
             </a:fld>
             <a:endParaRPr lang="en-US"/>
           </a:p>
@@ -3181,7 +3178,7 @@
             <a:fld id="{5CB36C16-490A-4898-BFC6-ECF705FECB62}" type="datetimeFigureOut">
               <a:rPr lang="en-US" smtClean="0"/>
               <a:pPr/>
-              <a:t>5/21/2020</a:t>
+              <a:t>5/26/2020</a:t>
             </a:fld>
             <a:endParaRPr lang="en-US"/>
           </a:p>
@@ -3635,12 +3632,12 @@
         <p:spPr>
           <a:xfrm>
             <a:off x="685800" y="228600"/>
-            <a:ext cx="7772400" cy="990600"/>
+            <a:ext cx="7772400" cy="533400"/>
           </a:xfrm>
         </p:spPr>
         <p:txBody>
           <a:bodyPr>
-            <a:normAutofit/>
+            <a:normAutofit fontScale="90000"/>
           </a:bodyPr>
           <a:lstStyle/>
           <a:p>
@@ -3678,13 +3675,13 @@
         </p:nvSpPr>
         <p:spPr>
           <a:xfrm>
-            <a:off x="228600" y="1219200"/>
-            <a:ext cx="8534400" cy="5638800"/>
+            <a:off x="228600" y="762000"/>
+            <a:ext cx="8534400" cy="5867400"/>
           </a:xfrm>
         </p:spPr>
         <p:txBody>
           <a:bodyPr>
-            <a:normAutofit/>
+            <a:normAutofit lnSpcReduction="10000"/>
           </a:bodyPr>
           <a:lstStyle/>
           <a:p>
@@ -3697,8 +3694,18 @@
                   </a:schemeClr>
                 </a:solidFill>
               </a:rPr>
-              <a:t>Introduction to My Project Proposal</a:t>
-            </a:r>
+              <a:t>BETA PHASE PROJECT</a:t>
+            </a:r>
+          </a:p>
+          <a:p>
+            <a:endParaRPr lang="en-US" sz="4000" b="1" u="sng" dirty="0" smtClean="0">
+              <a:solidFill>
+                <a:schemeClr val="tx1">
+                  <a:lumMod val="75000"/>
+                  <a:lumOff val="25000"/>
+                </a:schemeClr>
+              </a:solidFill>
+            </a:endParaRPr>
           </a:p>
           <a:p>
             <a:r>
@@ -3710,7 +3717,18 @@
                   </a:schemeClr>
                 </a:solidFill>
               </a:rPr>
-              <a:t>Author Name</a:t>
+              <a:t>Web App </a:t>
+            </a:r>
+            <a:r>
+              <a:rPr lang="en-US" sz="2800" b="1" u="sng" dirty="0" smtClean="0">
+                <a:solidFill>
+                  <a:schemeClr val="tx1">
+                    <a:lumMod val="75000"/>
+                    <a:lumOff val="25000"/>
+                  </a:schemeClr>
+                </a:solidFill>
+              </a:rPr>
+              <a:t>Name</a:t>
             </a:r>
             <a:r>
               <a:rPr lang="en-US" sz="2800" dirty="0" smtClean="0">
@@ -3721,8 +3739,29 @@
                   </a:schemeClr>
                 </a:solidFill>
               </a:rPr>
-              <a:t>: Banjoko Kazeem</a:t>
-            </a:r>
+              <a:t>: </a:t>
+            </a:r>
+            <a:r>
+              <a:rPr lang="en-US" sz="2800" b="1" dirty="0" smtClean="0">
+                <a:solidFill>
+                  <a:schemeClr val="tx1">
+                    <a:lumMod val="75000"/>
+                    <a:lumOff val="25000"/>
+                  </a:schemeClr>
+                </a:solidFill>
+              </a:rPr>
+              <a:t>LEARNNOW</a:t>
+            </a:r>
+          </a:p>
+          <a:p>
+            <a:endParaRPr lang="en-US" sz="2800" b="1" dirty="0" smtClean="0">
+              <a:solidFill>
+                <a:schemeClr val="tx1">
+                  <a:lumMod val="75000"/>
+                  <a:lumOff val="25000"/>
+                </a:schemeClr>
+              </a:solidFill>
+            </a:endParaRPr>
           </a:p>
           <a:p>
             <a:r>
@@ -3734,7 +3773,7 @@
                   </a:schemeClr>
                 </a:solidFill>
               </a:rPr>
-              <a:t>Project Name</a:t>
+              <a:t>Developer</a:t>
             </a:r>
             <a:r>
               <a:rPr lang="en-US" sz="2800" dirty="0" smtClean="0">
@@ -3745,8 +3784,42 @@
                   </a:schemeClr>
                 </a:solidFill>
               </a:rPr>
-              <a:t>: LearnNow</a:t>
-            </a:r>
+              <a:t>: </a:t>
+            </a:r>
+            <a:r>
+              <a:rPr lang="en-US" sz="2800" b="1" dirty="0" smtClean="0">
+                <a:solidFill>
+                  <a:schemeClr val="tx1">
+                    <a:lumMod val="75000"/>
+                    <a:lumOff val="25000"/>
+                  </a:schemeClr>
+                </a:solidFill>
+              </a:rPr>
+              <a:t>BANJOKO KAZEEM</a:t>
+            </a:r>
+          </a:p>
+          <a:p>
+            <a:r>
+              <a:rPr lang="en-US" sz="2800" dirty="0" smtClean="0">
+                <a:solidFill>
+                  <a:schemeClr val="tx1">
+                    <a:lumMod val="75000"/>
+                    <a:lumOff val="25000"/>
+                  </a:schemeClr>
+                </a:solidFill>
+              </a:rPr>
+              <a:t>(COHORT HELIUM FULL STACK WEB DEVELOPER 2020)</a:t>
+            </a:r>
+          </a:p>
+          <a:p>
+            <a:endParaRPr lang="en-US" sz="2800" dirty="0" smtClean="0">
+              <a:solidFill>
+                <a:schemeClr val="tx1">
+                  <a:lumMod val="75000"/>
+                  <a:lumOff val="25000"/>
+                </a:schemeClr>
+              </a:solidFill>
+            </a:endParaRPr>
           </a:p>
           <a:p>
             <a:r>
@@ -3769,20 +3842,7 @@
                   </a:schemeClr>
                 </a:solidFill>
               </a:rPr>
-              <a:t>: Education</a:t>
-            </a:r>
-          </a:p>
-          <a:p>
-            <a:r>
-              <a:rPr lang="en-US" sz="2800" b="1" u="sng" dirty="0" smtClean="0">
-                <a:solidFill>
-                  <a:schemeClr val="tx1">
-                    <a:lumMod val="75000"/>
-                    <a:lumOff val="25000"/>
-                  </a:schemeClr>
-                </a:solidFill>
-              </a:rPr>
-              <a:t>Target Audience</a:t>
+              <a:t>: </a:t>
             </a:r>
             <a:r>
               <a:rPr lang="en-US" sz="2800" dirty="0" smtClean="0">
@@ -3793,21 +3853,20 @@
                   </a:schemeClr>
                 </a:solidFill>
               </a:rPr>
-              <a:t>: Students and Non-Students</a:t>
-            </a:r>
-          </a:p>
-          <a:p>
-            <a:r>
-              <a:rPr lang="en-US" sz="2800" b="1" u="sng" dirty="0" smtClean="0">
-                <a:solidFill>
-                  <a:schemeClr val="tx1">
-                    <a:lumMod val="75000"/>
-                    <a:lumOff val="25000"/>
-                  </a:schemeClr>
-                </a:solidFill>
-              </a:rPr>
-              <a:t>Project Date</a:t>
-            </a:r>
+              <a:t>Education</a:t>
+            </a:r>
+          </a:p>
+          <a:p>
+            <a:endParaRPr lang="en-US" dirty="0" smtClean="0">
+              <a:solidFill>
+                <a:schemeClr val="tx1">
+                  <a:lumMod val="75000"/>
+                  <a:lumOff val="25000"/>
+                </a:schemeClr>
+              </a:solidFill>
+            </a:endParaRPr>
+          </a:p>
+          <a:p>
             <a:r>
               <a:rPr lang="en-US" sz="2800" dirty="0" smtClean="0">
                 <a:solidFill>
@@ -3817,32 +3876,16 @@
                   </a:schemeClr>
                 </a:solidFill>
               </a:rPr>
-              <a:t>: April 2020.</a:t>
-            </a:r>
-          </a:p>
-          <a:p>
-            <a:r>
-              <a:rPr lang="en-US" sz="2800" b="1" u="sng" dirty="0" smtClean="0">
-                <a:solidFill>
-                  <a:schemeClr val="tx1">
-                    <a:lumMod val="75000"/>
-                    <a:lumOff val="25000"/>
-                  </a:schemeClr>
-                </a:solidFill>
-              </a:rPr>
-              <a:t>Launch Date</a:t>
-            </a:r>
-            <a:r>
-              <a:rPr lang="en-US" sz="2800" dirty="0" smtClean="0">
-                <a:solidFill>
-                  <a:schemeClr val="tx1">
-                    <a:lumMod val="75000"/>
-                    <a:lumOff val="25000"/>
-                  </a:schemeClr>
-                </a:solidFill>
-              </a:rPr>
-              <a:t>: May 2020 .</a:t>
-            </a:r>
+              <a:t>08084833968 | banjoko10@gmail.com</a:t>
+            </a:r>
+            <a:endParaRPr lang="en-US" sz="2800" dirty="0" smtClean="0">
+              <a:solidFill>
+                <a:schemeClr val="tx1">
+                  <a:lumMod val="75000"/>
+                  <a:lumOff val="25000"/>
+                </a:schemeClr>
+              </a:solidFill>
+            </a:endParaRPr>
           </a:p>
           <a:p>
             <a:endParaRPr lang="en-US" dirty="0" smtClean="0">
@@ -4069,7 +4112,7 @@
                                         <p:tgtEl>
                                           <p:spTgt spid="3">
                                             <p:txEl>
-                                              <p:pRg st="1" end="1"/>
+                                              <p:pRg st="2" end="2"/>
                                             </p:txEl>
                                           </p:spTgt>
                                         </p:tgtEl>
@@ -4087,7 +4130,7 @@
                                         <p:tgtEl>
                                           <p:spTgt spid="3">
                                             <p:txEl>
-                                              <p:pRg st="1" end="1"/>
+                                              <p:pRg st="2" end="2"/>
                                             </p:txEl>
                                           </p:spTgt>
                                         </p:tgtEl>
@@ -4114,7 +4157,7 @@
                                         <p:tgtEl>
                                           <p:spTgt spid="3">
                                             <p:txEl>
-                                              <p:pRg st="1" end="1"/>
+                                              <p:pRg st="2" end="2"/>
                                             </p:txEl>
                                           </p:spTgt>
                                         </p:tgtEl>
@@ -4172,7 +4215,7 @@
                                         <p:tgtEl>
                                           <p:spTgt spid="3">
                                             <p:txEl>
-                                              <p:pRg st="2" end="2"/>
+                                              <p:pRg st="4" end="4"/>
                                             </p:txEl>
                                           </p:spTgt>
                                         </p:tgtEl>
@@ -4190,7 +4233,7 @@
                                         <p:tgtEl>
                                           <p:spTgt spid="3">
                                             <p:txEl>
-                                              <p:pRg st="2" end="2"/>
+                                              <p:pRg st="4" end="4"/>
                                             </p:txEl>
                                           </p:spTgt>
                                         </p:tgtEl>
@@ -4217,7 +4260,7 @@
                                         <p:tgtEl>
                                           <p:spTgt spid="3">
                                             <p:txEl>
-                                              <p:pRg st="2" end="2"/>
+                                              <p:pRg st="4" end="4"/>
                                             </p:txEl>
                                           </p:spTgt>
                                         </p:tgtEl>
@@ -4275,7 +4318,7 @@
                                         <p:tgtEl>
                                           <p:spTgt spid="3">
                                             <p:txEl>
-                                              <p:pRg st="3" end="3"/>
+                                              <p:pRg st="5" end="5"/>
                                             </p:txEl>
                                           </p:spTgt>
                                         </p:tgtEl>
@@ -4293,7 +4336,7 @@
                                         <p:tgtEl>
                                           <p:spTgt spid="3">
                                             <p:txEl>
-                                              <p:pRg st="3" end="3"/>
+                                              <p:pRg st="5" end="5"/>
                                             </p:txEl>
                                           </p:spTgt>
                                         </p:tgtEl>
@@ -4320,7 +4363,7 @@
                                         <p:tgtEl>
                                           <p:spTgt spid="3">
                                             <p:txEl>
-                                              <p:pRg st="3" end="3"/>
+                                              <p:pRg st="5" end="5"/>
                                             </p:txEl>
                                           </p:spTgt>
                                         </p:tgtEl>
@@ -4378,7 +4421,7 @@
                                         <p:tgtEl>
                                           <p:spTgt spid="3">
                                             <p:txEl>
-                                              <p:pRg st="4" end="4"/>
+                                              <p:pRg st="7" end="7"/>
                                             </p:txEl>
                                           </p:spTgt>
                                         </p:tgtEl>
@@ -4396,7 +4439,7 @@
                                         <p:tgtEl>
                                           <p:spTgt spid="3">
                                             <p:txEl>
-                                              <p:pRg st="4" end="4"/>
+                                              <p:pRg st="7" end="7"/>
                                             </p:txEl>
                                           </p:spTgt>
                                         </p:tgtEl>
@@ -4423,7 +4466,7 @@
                                         <p:tgtEl>
                                           <p:spTgt spid="3">
                                             <p:txEl>
-                                              <p:pRg st="4" end="4"/>
+                                              <p:pRg st="7" end="7"/>
                                             </p:txEl>
                                           </p:spTgt>
                                         </p:tgtEl>
@@ -4481,7 +4524,7 @@
                                         <p:tgtEl>
                                           <p:spTgt spid="3">
                                             <p:txEl>
-                                              <p:pRg st="5" end="5"/>
+                                              <p:pRg st="9" end="9"/>
                                             </p:txEl>
                                           </p:spTgt>
                                         </p:tgtEl>
@@ -4499,7 +4542,7 @@
                                         <p:tgtEl>
                                           <p:spTgt spid="3">
                                             <p:txEl>
-                                              <p:pRg st="5" end="5"/>
+                                              <p:pRg st="9" end="9"/>
                                             </p:txEl>
                                           </p:spTgt>
                                         </p:tgtEl>
@@ -4526,110 +4569,7 @@
                                         <p:tgtEl>
                                           <p:spTgt spid="3">
                                             <p:txEl>
-                                              <p:pRg st="5" end="5"/>
-                                            </p:txEl>
-                                          </p:spTgt>
-                                        </p:tgtEl>
-                                        <p:attrNameLst>
-                                          <p:attrName>ppt_y</p:attrName>
-                                        </p:attrNameLst>
-                                      </p:cBhvr>
-                                      <p:tavLst>
-                                        <p:tav tm="0">
-                                          <p:val>
-                                            <p:strVal val="1+#ppt_h/2"/>
-                                          </p:val>
-                                        </p:tav>
-                                        <p:tav tm="100000">
-                                          <p:val>
-                                            <p:strVal val="#ppt_y"/>
-                                          </p:val>
-                                        </p:tav>
-                                      </p:tavLst>
-                                    </p:anim>
-                                  </p:childTnLst>
-                                </p:cTn>
-                              </p:par>
-                            </p:childTnLst>
-                          </p:cTn>
-                        </p:par>
-                      </p:childTnLst>
-                    </p:cTn>
-                  </p:par>
-                  <p:par>
-                    <p:cTn id="44" fill="hold">
-                      <p:stCondLst>
-                        <p:cond delay="indefinite"/>
-                      </p:stCondLst>
-                      <p:childTnLst>
-                        <p:par>
-                          <p:cTn id="45" fill="hold">
-                            <p:stCondLst>
-                              <p:cond delay="0"/>
-                            </p:stCondLst>
-                            <p:childTnLst>
-                              <p:par>
-                                <p:cTn id="46" presetID="2" presetClass="entr" presetSubtype="4" fill="hold" grpId="0" nodeType="clickEffect">
-                                  <p:stCondLst>
-                                    <p:cond delay="0"/>
-                                  </p:stCondLst>
-                                  <p:childTnLst>
-                                    <p:set>
-                                      <p:cBhvr>
-                                        <p:cTn id="47" dur="1" fill="hold">
-                                          <p:stCondLst>
-                                            <p:cond delay="0"/>
-                                          </p:stCondLst>
-                                        </p:cTn>
-                                        <p:tgtEl>
-                                          <p:spTgt spid="3">
-                                            <p:txEl>
-                                              <p:pRg st="6" end="6"/>
-                                            </p:txEl>
-                                          </p:spTgt>
-                                        </p:tgtEl>
-                                        <p:attrNameLst>
-                                          <p:attrName>style.visibility</p:attrName>
-                                        </p:attrNameLst>
-                                      </p:cBhvr>
-                                      <p:to>
-                                        <p:strVal val="visible"/>
-                                      </p:to>
-                                    </p:set>
-                                    <p:anim calcmode="lin" valueType="num">
-                                      <p:cBhvr additive="base">
-                                        <p:cTn id="48" dur="500" fill="hold"/>
-                                        <p:tgtEl>
-                                          <p:spTgt spid="3">
-                                            <p:txEl>
-                                              <p:pRg st="6" end="6"/>
-                                            </p:txEl>
-                                          </p:spTgt>
-                                        </p:tgtEl>
-                                        <p:attrNameLst>
-                                          <p:attrName>ppt_x</p:attrName>
-                                        </p:attrNameLst>
-                                      </p:cBhvr>
-                                      <p:tavLst>
-                                        <p:tav tm="0">
-                                          <p:val>
-                                            <p:strVal val="#ppt_x"/>
-                                          </p:val>
-                                        </p:tav>
-                                        <p:tav tm="100000">
-                                          <p:val>
-                                            <p:strVal val="#ppt_x"/>
-                                          </p:val>
-                                        </p:tav>
-                                      </p:tavLst>
-                                    </p:anim>
-                                    <p:anim calcmode="lin" valueType="num">
-                                      <p:cBhvr additive="base">
-                                        <p:cTn id="49" dur="500" fill="hold"/>
-                                        <p:tgtEl>
-                                          <p:spTgt spid="3">
-                                            <p:txEl>
-                                              <p:pRg st="6" end="6"/>
+                                              <p:pRg st="9" end="9"/>
                                             </p:txEl>
                                           </p:spTgt>
                                         </p:tgtEl>
@@ -4717,36 +4657,8 @@
         </p:nvSpPr>
         <p:spPr>
           <a:xfrm>
-            <a:off x="457200" y="152400"/>
-            <a:ext cx="8229600" cy="762000"/>
-          </a:xfrm>
-        </p:spPr>
-        <p:txBody>
-          <a:bodyPr/>
-          <a:lstStyle/>
-          <a:p>
-            <a:r>
-              <a:rPr lang="en-US" b="1" u="sng" dirty="0" smtClean="0"/>
-              <a:t>Problem Statement</a:t>
-            </a:r>
-            <a:endParaRPr lang="en-US" b="1" u="sng" dirty="0"/>
-          </a:p>
-        </p:txBody>
-      </p:sp>
-      <p:sp>
-        <p:nvSpPr>
-          <p:cNvPr id="3" name="Content Placeholder 2"/>
-          <p:cNvSpPr>
-            <a:spLocks noGrp="1"/>
-          </p:cNvSpPr>
-          <p:nvPr>
-            <p:ph idx="1"/>
-          </p:nvPr>
-        </p:nvSpPr>
-        <p:spPr>
-          <a:xfrm>
-            <a:off x="381000" y="914400"/>
-            <a:ext cx="8534400" cy="5638800"/>
+            <a:off x="457200" y="228600"/>
+            <a:ext cx="8229600" cy="990600"/>
           </a:xfrm>
         </p:spPr>
         <p:txBody>
@@ -4755,214 +4667,11 @@
           </a:bodyPr>
           <a:lstStyle/>
           <a:p>
-            <a:pPr>
-              <a:buNone/>
-            </a:pPr>
-            <a:r>
-              <a:rPr lang="en-US" sz="3500" dirty="0" smtClean="0"/>
-              <a:t>	As we are all aware about COVID-19 (a pandemic virus outbreak) which is all over the world, students and everyone are informed to stay indoor to prevent the widespread of the Corona Virus Disease. In order to keep the students from being unengaged while at home, this project will help solve the issue of idleness.</a:t>
-            </a:r>
-            <a:endParaRPr lang="en-US" sz="3500" dirty="0"/>
-          </a:p>
-        </p:txBody>
-      </p:sp>
-    </p:spTree>
-  </p:cSld>
-  <p:clrMapOvr>
-    <a:masterClrMapping/>
-  </p:clrMapOvr>
-  <p:transition advClick="0" advTm="2000">
-    <p:wipe dir="d"/>
-  </p:transition>
-  <p:timing>
-    <p:tnLst>
-      <p:par>
-        <p:cTn id="1" dur="indefinite" restart="never" nodeType="tmRoot">
-          <p:childTnLst>
-            <p:seq concurrent="1" nextAc="seek">
-              <p:cTn id="2" dur="indefinite" nodeType="mainSeq">
-                <p:childTnLst>
-                  <p:par>
-                    <p:cTn id="3" fill="hold">
-                      <p:stCondLst>
-                        <p:cond delay="indefinite"/>
-                        <p:cond evt="onBegin" delay="0">
-                          <p:tn val="2"/>
-                        </p:cond>
-                      </p:stCondLst>
-                      <p:childTnLst>
-                        <p:par>
-                          <p:cTn id="4" fill="hold">
-                            <p:stCondLst>
-                              <p:cond delay="0"/>
-                            </p:stCondLst>
-                            <p:childTnLst>
-                              <p:par>
-                                <p:cTn id="5" presetID="12" presetClass="entr" presetSubtype="4" fill="hold" grpId="0" nodeType="withEffect">
-                                  <p:stCondLst>
-                                    <p:cond delay="0"/>
-                                  </p:stCondLst>
-                                  <p:childTnLst>
-                                    <p:set>
-                                      <p:cBhvr>
-                                        <p:cTn id="6" dur="1" fill="hold">
-                                          <p:stCondLst>
-                                            <p:cond delay="0"/>
-                                          </p:stCondLst>
-                                        </p:cTn>
-                                        <p:tgtEl>
-                                          <p:spTgt spid="2"/>
-                                        </p:tgtEl>
-                                        <p:attrNameLst>
-                                          <p:attrName>style.visibility</p:attrName>
-                                        </p:attrNameLst>
-                                      </p:cBhvr>
-                                      <p:to>
-                                        <p:strVal val="visible"/>
-                                      </p:to>
-                                    </p:set>
-                                    <p:animEffect transition="in" filter="slide(fromBottom)">
-                                      <p:cBhvr>
-                                        <p:cTn id="7" dur="500"/>
-                                        <p:tgtEl>
-                                          <p:spTgt spid="2"/>
-                                        </p:tgtEl>
-                                      </p:cBhvr>
-                                    </p:animEffect>
-                                  </p:childTnLst>
-                                </p:cTn>
-                              </p:par>
-                            </p:childTnLst>
-                          </p:cTn>
-                        </p:par>
-                        <p:par>
-                          <p:cTn id="8" fill="hold">
-                            <p:stCondLst>
-                              <p:cond delay="500"/>
-                            </p:stCondLst>
-                            <p:childTnLst>
-                              <p:par>
-                                <p:cTn id="9" presetID="21" presetClass="entr" presetSubtype="1" fill="hold" grpId="0" nodeType="afterEffect">
-                                  <p:stCondLst>
-                                    <p:cond delay="0"/>
-                                  </p:stCondLst>
-                                  <p:childTnLst>
-                                    <p:set>
-                                      <p:cBhvr>
-                                        <p:cTn id="10" dur="1" fill="hold">
-                                          <p:stCondLst>
-                                            <p:cond delay="0"/>
-                                          </p:stCondLst>
-                                        </p:cTn>
-                                        <p:tgtEl>
-                                          <p:spTgt spid="3">
-                                            <p:txEl>
-                                              <p:pRg st="0" end="0"/>
-                                            </p:txEl>
-                                          </p:spTgt>
-                                        </p:tgtEl>
-                                        <p:attrNameLst>
-                                          <p:attrName>style.visibility</p:attrName>
-                                        </p:attrNameLst>
-                                      </p:cBhvr>
-                                      <p:to>
-                                        <p:strVal val="visible"/>
-                                      </p:to>
-                                    </p:set>
-                                    <p:animEffect transition="in" filter="wheel(1)">
-                                      <p:cBhvr>
-                                        <p:cTn id="11" dur="500"/>
-                                        <p:tgtEl>
-                                          <p:spTgt spid="3">
-                                            <p:txEl>
-                                              <p:pRg st="0" end="0"/>
-                                            </p:txEl>
-                                          </p:spTgt>
-                                        </p:tgtEl>
-                                      </p:cBhvr>
-                                    </p:animEffect>
-                                  </p:childTnLst>
-                                </p:cTn>
-                              </p:par>
-                            </p:childTnLst>
-                          </p:cTn>
-                        </p:par>
-                      </p:childTnLst>
-                    </p:cTn>
-                  </p:par>
-                </p:childTnLst>
-              </p:cTn>
-              <p:prevCondLst>
-                <p:cond evt="onPrev" delay="0">
-                  <p:tgtEl>
-                    <p:sldTgt/>
-                  </p:tgtEl>
-                </p:cond>
-              </p:prevCondLst>
-              <p:nextCondLst>
-                <p:cond evt="onNext" delay="0">
-                  <p:tgtEl>
-                    <p:sldTgt/>
-                  </p:tgtEl>
-                </p:cond>
-              </p:nextCondLst>
-            </p:seq>
-          </p:childTnLst>
-        </p:cTn>
-      </p:par>
-    </p:tnLst>
-    <p:bldLst>
-      <p:bldP spid="2" grpId="0"/>
-      <p:bldP spid="3" grpId="0" build="p"/>
-    </p:bldLst>
-  </p:timing>
-</p:sld>
-</file>
-
-<file path=ppt/slides/slide3.xml><?xml version="1.0" encoding="utf-8"?>
-<p:sld xmlns:a="http://schemas.openxmlformats.org/drawingml/2006/main" xmlns:r="http://schemas.openxmlformats.org/officeDocument/2006/relationships" xmlns:p="http://schemas.openxmlformats.org/presentationml/2006/main">
-  <p:cSld>
-    <p:spTree>
-      <p:nvGrpSpPr>
-        <p:cNvPr id="1" name=""/>
-        <p:cNvGrpSpPr/>
-        <p:nvPr/>
-      </p:nvGrpSpPr>
-      <p:grpSpPr>
-        <a:xfrm>
-          <a:off x="0" y="0"/>
-          <a:ext cx="0" cy="0"/>
-          <a:chOff x="0" y="0"/>
-          <a:chExt cx="0" cy="0"/>
-        </a:xfrm>
-      </p:grpSpPr>
-      <p:sp>
-        <p:nvSpPr>
-          <p:cNvPr id="2" name="Title 1"/>
-          <p:cNvSpPr>
-            <a:spLocks noGrp="1"/>
-          </p:cNvSpPr>
-          <p:nvPr>
-            <p:ph type="title"/>
-          </p:nvPr>
-        </p:nvSpPr>
-        <p:spPr>
-          <a:xfrm>
-            <a:off x="457200" y="228600"/>
-            <a:ext cx="8229600" cy="990600"/>
-          </a:xfrm>
-        </p:spPr>
-        <p:txBody>
-          <a:bodyPr>
-            <a:normAutofit fontScale="90000"/>
-          </a:bodyPr>
-          <a:lstStyle/>
-          <a:p>
-            <a:r>
-              <a:rPr lang="en-US" b="1" u="sng" dirty="0" smtClean="0"/>
-              <a:t>Ultimate Purpose Of This Project</a:t>
-            </a:r>
-            <a:endParaRPr lang="en-US" b="1" u="sng" dirty="0"/>
+            <a:r>
+              <a:rPr lang="en-US" sz="3200" b="1" u="sng" dirty="0" smtClean="0"/>
+              <a:t>PROBLEMS LEARNNOW WILL SOLVE</a:t>
+            </a:r>
+            <a:endParaRPr lang="en-US" sz="3200" b="1" u="sng" dirty="0"/>
           </a:p>
         </p:txBody>
       </p:sp>
@@ -4988,23 +4697,31 @@
           </a:bodyPr>
           <a:lstStyle/>
           <a:p>
+            <a:endParaRPr lang="en-US" sz="3600" dirty="0" smtClean="0"/>
+          </a:p>
+          <a:p>
             <a:r>
               <a:rPr lang="en-US" sz="3600" dirty="0" smtClean="0"/>
-              <a:t>This project serves as a major instrument for pupils to study and practice online via the use of technology.</a:t>
-            </a:r>
-          </a:p>
-          <a:p>
+              <a:t>This </a:t>
+            </a:r>
             <a:r>
               <a:rPr lang="en-US" sz="3600" dirty="0" smtClean="0"/>
-              <a:t>To reduce the level of illiteracy in the society.</a:t>
-            </a:r>
-          </a:p>
-          <a:p>
+              <a:t>web app will help to </a:t>
+            </a:r>
             <a:r>
               <a:rPr lang="en-US" sz="3600" dirty="0" smtClean="0"/>
-              <a:t>Serves as an alternative to learning.</a:t>
-            </a:r>
-            <a:endParaRPr lang="en-US" sz="3600" dirty="0"/>
+              <a:t>reduce the rate of illiteracy in the society.</a:t>
+            </a:r>
+          </a:p>
+          <a:p>
+            <a:endParaRPr lang="en-US" sz="3600" dirty="0" smtClean="0"/>
+          </a:p>
+          <a:p>
+            <a:r>
+              <a:rPr lang="en-US" sz="3600" dirty="0" smtClean="0"/>
+              <a:t>It will also help to improve users arithmetic skills and grammer speaking.</a:t>
+            </a:r>
+            <a:endParaRPr lang="en-US" sz="3600" dirty="0" smtClean="0"/>
           </a:p>
         </p:txBody>
       </p:sp>
@@ -5090,7 +4807,7 @@
                                         <p:tgtEl>
                                           <p:spTgt spid="3">
                                             <p:txEl>
-                                              <p:pRg st="0" end="0"/>
+                                              <p:pRg st="1" end="1"/>
                                             </p:txEl>
                                           </p:spTgt>
                                         </p:tgtEl>
@@ -5108,7 +4825,7 @@
                                         <p:tgtEl>
                                           <p:spTgt spid="3">
                                             <p:txEl>
-                                              <p:pRg st="0" end="0"/>
+                                              <p:pRg st="1" end="1"/>
                                             </p:txEl>
                                           </p:spTgt>
                                         </p:tgtEl>
@@ -5135,7 +4852,7 @@
                                         <p:tgtEl>
                                           <p:spTgt spid="3">
                                             <p:txEl>
-                                              <p:pRg st="0" end="0"/>
+                                              <p:pRg st="1" end="1"/>
                                             </p:txEl>
                                           </p:spTgt>
                                         </p:tgtEl>
@@ -5162,201 +4879,7 @@
                                         <p:tgtEl>
                                           <p:spTgt spid="3">
                                             <p:txEl>
-                                              <p:pRg st="0" end="0"/>
-                                            </p:txEl>
-                                          </p:spTgt>
-                                        </p:tgtEl>
-                                      </p:cBhvr>
-                                    </p:animEffect>
-                                  </p:childTnLst>
-                                </p:cTn>
-                              </p:par>
-                              <p:par>
-                                <p:cTn id="13" presetID="53" presetClass="entr" presetSubtype="0" fill="hold" grpId="0" nodeType="withEffect">
-                                  <p:stCondLst>
-                                    <p:cond delay="0"/>
-                                  </p:stCondLst>
-                                  <p:childTnLst>
-                                    <p:set>
-                                      <p:cBhvr>
-                                        <p:cTn id="14" dur="1" fill="hold">
-                                          <p:stCondLst>
-                                            <p:cond delay="0"/>
-                                          </p:stCondLst>
-                                        </p:cTn>
-                                        <p:tgtEl>
-                                          <p:spTgt spid="3">
-                                            <p:txEl>
                                               <p:pRg st="1" end="1"/>
-                                            </p:txEl>
-                                          </p:spTgt>
-                                        </p:tgtEl>
-                                        <p:attrNameLst>
-                                          <p:attrName>style.visibility</p:attrName>
-                                        </p:attrNameLst>
-                                      </p:cBhvr>
-                                      <p:to>
-                                        <p:strVal val="visible"/>
-                                      </p:to>
-                                    </p:set>
-                                    <p:anim calcmode="lin" valueType="num">
-                                      <p:cBhvr>
-                                        <p:cTn id="15" dur="500" fill="hold"/>
-                                        <p:tgtEl>
-                                          <p:spTgt spid="3">
-                                            <p:txEl>
-                                              <p:pRg st="1" end="1"/>
-                                            </p:txEl>
-                                          </p:spTgt>
-                                        </p:tgtEl>
-                                        <p:attrNameLst>
-                                          <p:attrName>ppt_w</p:attrName>
-                                        </p:attrNameLst>
-                                      </p:cBhvr>
-                                      <p:tavLst>
-                                        <p:tav tm="0">
-                                          <p:val>
-                                            <p:fltVal val="0"/>
-                                          </p:val>
-                                        </p:tav>
-                                        <p:tav tm="100000">
-                                          <p:val>
-                                            <p:strVal val="#ppt_w"/>
-                                          </p:val>
-                                        </p:tav>
-                                      </p:tavLst>
-                                    </p:anim>
-                                    <p:anim calcmode="lin" valueType="num">
-                                      <p:cBhvr>
-                                        <p:cTn id="16" dur="500" fill="hold"/>
-                                        <p:tgtEl>
-                                          <p:spTgt spid="3">
-                                            <p:txEl>
-                                              <p:pRg st="1" end="1"/>
-                                            </p:txEl>
-                                          </p:spTgt>
-                                        </p:tgtEl>
-                                        <p:attrNameLst>
-                                          <p:attrName>ppt_h</p:attrName>
-                                        </p:attrNameLst>
-                                      </p:cBhvr>
-                                      <p:tavLst>
-                                        <p:tav tm="0">
-                                          <p:val>
-                                            <p:fltVal val="0"/>
-                                          </p:val>
-                                        </p:tav>
-                                        <p:tav tm="100000">
-                                          <p:val>
-                                            <p:strVal val="#ppt_h"/>
-                                          </p:val>
-                                        </p:tav>
-                                      </p:tavLst>
-                                    </p:anim>
-                                    <p:animEffect transition="in" filter="fade">
-                                      <p:cBhvr>
-                                        <p:cTn id="17" dur="500"/>
-                                        <p:tgtEl>
-                                          <p:spTgt spid="3">
-                                            <p:txEl>
-                                              <p:pRg st="1" end="1"/>
-                                            </p:txEl>
-                                          </p:spTgt>
-                                        </p:tgtEl>
-                                      </p:cBhvr>
-                                    </p:animEffect>
-                                  </p:childTnLst>
-                                </p:cTn>
-                              </p:par>
-                              <p:par>
-                                <p:cTn id="18" presetID="53" presetClass="entr" presetSubtype="0" fill="hold" grpId="0" nodeType="withEffect">
-                                  <p:stCondLst>
-                                    <p:cond delay="0"/>
-                                  </p:stCondLst>
-                                  <p:childTnLst>
-                                    <p:set>
-                                      <p:cBhvr>
-                                        <p:cTn id="19" dur="1" fill="hold">
-                                          <p:stCondLst>
-                                            <p:cond delay="0"/>
-                                          </p:stCondLst>
-                                        </p:cTn>
-                                        <p:tgtEl>
-                                          <p:spTgt spid="3">
-                                            <p:txEl>
-                                              <p:pRg st="2" end="2"/>
-                                            </p:txEl>
-                                          </p:spTgt>
-                                        </p:tgtEl>
-                                        <p:attrNameLst>
-                                          <p:attrName>style.visibility</p:attrName>
-                                        </p:attrNameLst>
-                                      </p:cBhvr>
-                                      <p:to>
-                                        <p:strVal val="visible"/>
-                                      </p:to>
-                                    </p:set>
-                                    <p:anim calcmode="lin" valueType="num">
-                                      <p:cBhvr>
-                                        <p:cTn id="20" dur="500" fill="hold"/>
-                                        <p:tgtEl>
-                                          <p:spTgt spid="3">
-                                            <p:txEl>
-                                              <p:pRg st="2" end="2"/>
-                                            </p:txEl>
-                                          </p:spTgt>
-                                        </p:tgtEl>
-                                        <p:attrNameLst>
-                                          <p:attrName>ppt_w</p:attrName>
-                                        </p:attrNameLst>
-                                      </p:cBhvr>
-                                      <p:tavLst>
-                                        <p:tav tm="0">
-                                          <p:val>
-                                            <p:fltVal val="0"/>
-                                          </p:val>
-                                        </p:tav>
-                                        <p:tav tm="100000">
-                                          <p:val>
-                                            <p:strVal val="#ppt_w"/>
-                                          </p:val>
-                                        </p:tav>
-                                      </p:tavLst>
-                                    </p:anim>
-                                    <p:anim calcmode="lin" valueType="num">
-                                      <p:cBhvr>
-                                        <p:cTn id="21" dur="500" fill="hold"/>
-                                        <p:tgtEl>
-                                          <p:spTgt spid="3">
-                                            <p:txEl>
-                                              <p:pRg st="2" end="2"/>
-                                            </p:txEl>
-                                          </p:spTgt>
-                                        </p:tgtEl>
-                                        <p:attrNameLst>
-                                          <p:attrName>ppt_h</p:attrName>
-                                        </p:attrNameLst>
-                                      </p:cBhvr>
-                                      <p:tavLst>
-                                        <p:tav tm="0">
-                                          <p:val>
-                                            <p:fltVal val="0"/>
-                                          </p:val>
-                                        </p:tav>
-                                        <p:tav tm="100000">
-                                          <p:val>
-                                            <p:strVal val="#ppt_h"/>
-                                          </p:val>
-                                        </p:tav>
-                                      </p:tavLst>
-                                    </p:anim>
-                                    <p:animEffect transition="in" filter="fade">
-                                      <p:cBhvr>
-                                        <p:cTn id="22" dur="500"/>
-                                        <p:tgtEl>
-                                          <p:spTgt spid="3">
-                                            <p:txEl>
-                                              <p:pRg st="2" end="2"/>
                                             </p:txEl>
                                           </p:spTgt>
                                         </p:tgtEl>
@@ -5400,7 +4923,7 @@
 </p:sld>
 </file>
 
-<file path=ppt/slides/slide4.xml><?xml version="1.0" encoding="utf-8"?>
+<file path=ppt/slides/slide3.xml><?xml version="1.0" encoding="utf-8"?>
 <p:sld xmlns:a="http://schemas.openxmlformats.org/drawingml/2006/main" xmlns:r="http://schemas.openxmlformats.org/officeDocument/2006/relationships" xmlns:p="http://schemas.openxmlformats.org/presentationml/2006/main">
   <p:cSld>
     <p:spTree>
@@ -5430,17 +4953,17 @@
         <p:spPr>
           <a:xfrm>
             <a:off x="457200" y="152400"/>
-            <a:ext cx="8229600" cy="533400"/>
+            <a:ext cx="8229600" cy="1371600"/>
           </a:xfrm>
         </p:spPr>
         <p:txBody>
           <a:bodyPr>
-            <a:normAutofit fontScale="90000"/>
+            <a:normAutofit/>
           </a:bodyPr>
           <a:lstStyle/>
           <a:p>
             <a:r>
-              <a:rPr lang="en-US" b="1" u="sng" smtClean="0"/>
+              <a:rPr lang="en-US" b="1" u="sng" dirty="0" smtClean="0"/>
               <a:t>Technologies used</a:t>
             </a:r>
             <a:endParaRPr lang="en-US" b="1" u="sng" dirty="0"/>
@@ -5459,8 +4982,8 @@
         </p:nvSpPr>
         <p:spPr>
           <a:xfrm>
-            <a:off x="1752600" y="838200"/>
-            <a:ext cx="6934200" cy="5471160"/>
+            <a:off x="685800" y="1905000"/>
+            <a:ext cx="7924800" cy="4404360"/>
           </a:xfrm>
         </p:spPr>
         <p:txBody>
@@ -5469,137 +4992,45 @@
           </a:bodyPr>
           <a:lstStyle/>
           <a:p>
-            <a:pPr lvl="5">
+            <a:pPr lvl="4">
               <a:buFont typeface="Wingdings" pitchFamily="2" charset="2"/>
               <a:buChar char="v"/>
             </a:pPr>
             <a:r>
-              <a:rPr lang="en-US" sz="2200" b="1" dirty="0" smtClean="0"/>
-              <a:t>Frontend:</a:t>
-            </a:r>
-          </a:p>
-          <a:p>
-            <a:pPr lvl="7">
-              <a:buFont typeface="Wingdings" pitchFamily="2" charset="2"/>
-              <a:buChar char="Ø"/>
-            </a:pPr>
-            <a:r>
-              <a:rPr lang="en-US" sz="2200" b="1" dirty="0" err="1" smtClean="0"/>
+              <a:rPr lang="en-US" sz="5000" b="1" dirty="0" smtClean="0"/>
               <a:t>VueJs</a:t>
             </a:r>
-            <a:endParaRPr lang="en-US" sz="2200" b="1" dirty="0" smtClean="0"/>
-          </a:p>
-          <a:p>
-            <a:pPr lvl="7">
-              <a:buFont typeface="Wingdings" pitchFamily="2" charset="2"/>
-              <a:buChar char="Ø"/>
-            </a:pPr>
-            <a:r>
-              <a:rPr lang="en-US" sz="2200" b="1" dirty="0" err="1" smtClean="0"/>
-              <a:t>Vuelidate</a:t>
-            </a:r>
-            <a:endParaRPr lang="en-US" sz="2200" b="1" dirty="0" smtClean="0"/>
-          </a:p>
-          <a:p>
-            <a:pPr lvl="7">
-              <a:buFont typeface="Wingdings" pitchFamily="2" charset="2"/>
-              <a:buChar char="Ø"/>
-            </a:pPr>
-            <a:r>
-              <a:rPr lang="en-US" sz="2200" b="1" dirty="0" smtClean="0"/>
-              <a:t>Sweet Alert</a:t>
-            </a:r>
-          </a:p>
-          <a:p>
-            <a:pPr lvl="7">
-              <a:buFont typeface="Wingdings" pitchFamily="2" charset="2"/>
-              <a:buChar char="Ø"/>
-            </a:pPr>
-            <a:r>
-              <a:rPr lang="en-US" sz="2200" b="1" dirty="0" smtClean="0"/>
-              <a:t>Bootstrap</a:t>
-            </a:r>
-          </a:p>
-          <a:p>
-            <a:pPr lvl="7">
-              <a:buFont typeface="Wingdings" pitchFamily="2" charset="2"/>
-              <a:buChar char="Ø"/>
-            </a:pPr>
-            <a:endParaRPr lang="en-US" sz="2200" b="1" dirty="0" smtClean="0"/>
-          </a:p>
-          <a:p>
-            <a:pPr lvl="5">
+            <a:endParaRPr lang="en-US" sz="5000" b="1" dirty="0" smtClean="0"/>
+          </a:p>
+          <a:p>
+            <a:pPr lvl="4">
               <a:buFont typeface="Wingdings" pitchFamily="2" charset="2"/>
               <a:buChar char="v"/>
             </a:pPr>
             <a:r>
-              <a:rPr lang="en-US" sz="2200" b="1" dirty="0" smtClean="0"/>
-              <a:t>Backend:</a:t>
-            </a:r>
-          </a:p>
-          <a:p>
-            <a:pPr lvl="7">
-              <a:buFont typeface="Wingdings" pitchFamily="2" charset="2"/>
-              <a:buChar char="Ø"/>
-            </a:pPr>
-            <a:r>
-              <a:rPr lang="en-US" sz="2200" b="1" dirty="0" smtClean="0"/>
-              <a:t>Firebase</a:t>
-            </a:r>
-          </a:p>
-          <a:p>
-            <a:pPr lvl="7">
-              <a:buFont typeface="Wingdings" pitchFamily="2" charset="2"/>
-              <a:buChar char="Ø"/>
-            </a:pPr>
-            <a:endParaRPr lang="en-US" sz="2200" b="1" dirty="0" smtClean="0"/>
-          </a:p>
-          <a:p>
-            <a:pPr lvl="5">
+              <a:rPr lang="en-US" sz="5000" b="1" dirty="0" smtClean="0"/>
+              <a:t>Cloud </a:t>
+            </a:r>
+            <a:r>
+              <a:rPr lang="en-US" sz="5000" b="1" dirty="0" smtClean="0"/>
+              <a:t>Firestore</a:t>
+            </a:r>
+          </a:p>
+          <a:p>
+            <a:pPr lvl="4">
               <a:buFont typeface="Wingdings" pitchFamily="2" charset="2"/>
               <a:buChar char="v"/>
             </a:pPr>
             <a:r>
-              <a:rPr lang="en-US" sz="2200" b="1" dirty="0" smtClean="0"/>
-              <a:t>Administrative Tool:</a:t>
-            </a:r>
-          </a:p>
-          <a:p>
-            <a:pPr lvl="7">
-              <a:buFont typeface="Wingdings" pitchFamily="2" charset="2"/>
-              <a:buChar char="Ø"/>
+              <a:rPr lang="en-US" sz="5000" b="1" dirty="0" smtClean="0"/>
+              <a:t>Firebase</a:t>
+            </a:r>
+          </a:p>
+          <a:p>
+            <a:pPr lvl="4">
+              <a:buNone/>
             </a:pPr>
-            <a:r>
-              <a:rPr lang="en-US" sz="2200" b="1" dirty="0" smtClean="0"/>
-              <a:t>Firebase</a:t>
-            </a:r>
-          </a:p>
-          <a:p>
-            <a:pPr lvl="7">
-              <a:buFont typeface="Wingdings" pitchFamily="2" charset="2"/>
-              <a:buChar char="Ø"/>
-            </a:pPr>
-            <a:endParaRPr lang="en-US" sz="2200" b="1" dirty="0" smtClean="0"/>
-          </a:p>
-          <a:p>
-            <a:pPr lvl="5">
-              <a:buFont typeface="Wingdings" pitchFamily="2" charset="2"/>
-              <a:buChar char="v"/>
-            </a:pPr>
-            <a:r>
-              <a:rPr lang="en-US" sz="2200" b="1" dirty="0" smtClean="0"/>
-              <a:t>Database:</a:t>
-            </a:r>
-          </a:p>
-          <a:p>
-            <a:pPr lvl="7">
-              <a:buFont typeface="Wingdings" pitchFamily="2" charset="2"/>
-              <a:buChar char="Ø"/>
-            </a:pPr>
-            <a:r>
-              <a:rPr lang="en-US" sz="2200" b="1" dirty="0" smtClean="0"/>
-              <a:t>Firebase</a:t>
-            </a:r>
+            <a:endParaRPr lang="en-US" sz="5000" b="1" dirty="0" smtClean="0"/>
           </a:p>
         </p:txBody>
       </p:sp>
@@ -5890,350 +5321,6 @@
                                   </p:childTnLst>
                                 </p:cTn>
                               </p:par>
-                              <p:par>
-                                <p:cTn id="21" presetID="21" presetClass="entr" presetSubtype="1" fill="hold" grpId="0" nodeType="withEffect">
-                                  <p:stCondLst>
-                                    <p:cond delay="0"/>
-                                  </p:stCondLst>
-                                  <p:childTnLst>
-                                    <p:set>
-                                      <p:cBhvr>
-                                        <p:cTn id="22" dur="1" fill="hold">
-                                          <p:stCondLst>
-                                            <p:cond delay="0"/>
-                                          </p:stCondLst>
-                                        </p:cTn>
-                                        <p:tgtEl>
-                                          <p:spTgt spid="3">
-                                            <p:txEl>
-                                              <p:pRg st="3" end="3"/>
-                                            </p:txEl>
-                                          </p:spTgt>
-                                        </p:tgtEl>
-                                        <p:attrNameLst>
-                                          <p:attrName>style.visibility</p:attrName>
-                                        </p:attrNameLst>
-                                      </p:cBhvr>
-                                      <p:to>
-                                        <p:strVal val="visible"/>
-                                      </p:to>
-                                    </p:set>
-                                    <p:animEffect transition="in" filter="wheel(1)">
-                                      <p:cBhvr>
-                                        <p:cTn id="23" dur="500"/>
-                                        <p:tgtEl>
-                                          <p:spTgt spid="3">
-                                            <p:txEl>
-                                              <p:pRg st="3" end="3"/>
-                                            </p:txEl>
-                                          </p:spTgt>
-                                        </p:tgtEl>
-                                      </p:cBhvr>
-                                    </p:animEffect>
-                                  </p:childTnLst>
-                                </p:cTn>
-                              </p:par>
-                              <p:par>
-                                <p:cTn id="24" presetID="21" presetClass="entr" presetSubtype="1" fill="hold" grpId="0" nodeType="withEffect">
-                                  <p:stCondLst>
-                                    <p:cond delay="0"/>
-                                  </p:stCondLst>
-                                  <p:childTnLst>
-                                    <p:set>
-                                      <p:cBhvr>
-                                        <p:cTn id="25" dur="1" fill="hold">
-                                          <p:stCondLst>
-                                            <p:cond delay="0"/>
-                                          </p:stCondLst>
-                                        </p:cTn>
-                                        <p:tgtEl>
-                                          <p:spTgt spid="3">
-                                            <p:txEl>
-                                              <p:pRg st="4" end="4"/>
-                                            </p:txEl>
-                                          </p:spTgt>
-                                        </p:tgtEl>
-                                        <p:attrNameLst>
-                                          <p:attrName>style.visibility</p:attrName>
-                                        </p:attrNameLst>
-                                      </p:cBhvr>
-                                      <p:to>
-                                        <p:strVal val="visible"/>
-                                      </p:to>
-                                    </p:set>
-                                    <p:animEffect transition="in" filter="wheel(1)">
-                                      <p:cBhvr>
-                                        <p:cTn id="26" dur="500"/>
-                                        <p:tgtEl>
-                                          <p:spTgt spid="3">
-                                            <p:txEl>
-                                              <p:pRg st="4" end="4"/>
-                                            </p:txEl>
-                                          </p:spTgt>
-                                        </p:tgtEl>
-                                      </p:cBhvr>
-                                    </p:animEffect>
-                                  </p:childTnLst>
-                                </p:cTn>
-                              </p:par>
-                              <p:par>
-                                <p:cTn id="27" presetID="21" presetClass="entr" presetSubtype="1" fill="hold" grpId="0" nodeType="withEffect">
-                                  <p:stCondLst>
-                                    <p:cond delay="0"/>
-                                  </p:stCondLst>
-                                  <p:childTnLst>
-                                    <p:set>
-                                      <p:cBhvr>
-                                        <p:cTn id="28" dur="1" fill="hold">
-                                          <p:stCondLst>
-                                            <p:cond delay="0"/>
-                                          </p:stCondLst>
-                                        </p:cTn>
-                                        <p:tgtEl>
-                                          <p:spTgt spid="3">
-                                            <p:txEl>
-                                              <p:pRg st="6" end="6"/>
-                                            </p:txEl>
-                                          </p:spTgt>
-                                        </p:tgtEl>
-                                        <p:attrNameLst>
-                                          <p:attrName>style.visibility</p:attrName>
-                                        </p:attrNameLst>
-                                      </p:cBhvr>
-                                      <p:to>
-                                        <p:strVal val="visible"/>
-                                      </p:to>
-                                    </p:set>
-                                    <p:animEffect transition="in" filter="wheel(1)">
-                                      <p:cBhvr>
-                                        <p:cTn id="29" dur="500"/>
-                                        <p:tgtEl>
-                                          <p:spTgt spid="3">
-                                            <p:txEl>
-                                              <p:pRg st="6" end="6"/>
-                                            </p:txEl>
-                                          </p:spTgt>
-                                        </p:tgtEl>
-                                      </p:cBhvr>
-                                    </p:animEffect>
-                                  </p:childTnLst>
-                                </p:cTn>
-                              </p:par>
-                              <p:par>
-                                <p:cTn id="30" presetID="21" presetClass="entr" presetSubtype="1" fill="hold" grpId="0" nodeType="withEffect">
-                                  <p:stCondLst>
-                                    <p:cond delay="0"/>
-                                  </p:stCondLst>
-                                  <p:childTnLst>
-                                    <p:set>
-                                      <p:cBhvr>
-                                        <p:cTn id="31" dur="1" fill="hold">
-                                          <p:stCondLst>
-                                            <p:cond delay="0"/>
-                                          </p:stCondLst>
-                                        </p:cTn>
-                                        <p:tgtEl>
-                                          <p:spTgt spid="3">
-                                            <p:txEl>
-                                              <p:pRg st="7" end="7"/>
-                                            </p:txEl>
-                                          </p:spTgt>
-                                        </p:tgtEl>
-                                        <p:attrNameLst>
-                                          <p:attrName>style.visibility</p:attrName>
-                                        </p:attrNameLst>
-                                      </p:cBhvr>
-                                      <p:to>
-                                        <p:strVal val="visible"/>
-                                      </p:to>
-                                    </p:set>
-                                    <p:animEffect transition="in" filter="wheel(1)">
-                                      <p:cBhvr>
-                                        <p:cTn id="32" dur="500"/>
-                                        <p:tgtEl>
-                                          <p:spTgt spid="3">
-                                            <p:txEl>
-                                              <p:pRg st="7" end="7"/>
-                                            </p:txEl>
-                                          </p:spTgt>
-                                        </p:tgtEl>
-                                      </p:cBhvr>
-                                    </p:animEffect>
-                                  </p:childTnLst>
-                                </p:cTn>
-                              </p:par>
-                              <p:par>
-                                <p:cTn id="33" presetID="21" presetClass="entr" presetSubtype="1" fill="hold" grpId="0" nodeType="withEffect">
-                                  <p:stCondLst>
-                                    <p:cond delay="0"/>
-                                  </p:stCondLst>
-                                  <p:childTnLst>
-                                    <p:set>
-                                      <p:cBhvr>
-                                        <p:cTn id="34" dur="1" fill="hold">
-                                          <p:stCondLst>
-                                            <p:cond delay="0"/>
-                                          </p:stCondLst>
-                                        </p:cTn>
-                                        <p:tgtEl>
-                                          <p:spTgt spid="3">
-                                            <p:txEl>
-                                              <p:pRg st="9" end="9"/>
-                                            </p:txEl>
-                                          </p:spTgt>
-                                        </p:tgtEl>
-                                        <p:attrNameLst>
-                                          <p:attrName>style.visibility</p:attrName>
-                                        </p:attrNameLst>
-                                      </p:cBhvr>
-                                      <p:to>
-                                        <p:strVal val="visible"/>
-                                      </p:to>
-                                    </p:set>
-                                    <p:animEffect transition="in" filter="wheel(1)">
-                                      <p:cBhvr>
-                                        <p:cTn id="35" dur="500"/>
-                                        <p:tgtEl>
-                                          <p:spTgt spid="3">
-                                            <p:txEl>
-                                              <p:pRg st="9" end="9"/>
-                                            </p:txEl>
-                                          </p:spTgt>
-                                        </p:tgtEl>
-                                      </p:cBhvr>
-                                    </p:animEffect>
-                                  </p:childTnLst>
-                                </p:cTn>
-                              </p:par>
-                              <p:par>
-                                <p:cTn id="36" presetID="21" presetClass="entr" presetSubtype="1" fill="hold" grpId="0" nodeType="withEffect">
-                                  <p:stCondLst>
-                                    <p:cond delay="0"/>
-                                  </p:stCondLst>
-                                  <p:childTnLst>
-                                    <p:set>
-                                      <p:cBhvr>
-                                        <p:cTn id="37" dur="1" fill="hold">
-                                          <p:stCondLst>
-                                            <p:cond delay="0"/>
-                                          </p:stCondLst>
-                                        </p:cTn>
-                                        <p:tgtEl>
-                                          <p:spTgt spid="3">
-                                            <p:txEl>
-                                              <p:pRg st="10" end="10"/>
-                                            </p:txEl>
-                                          </p:spTgt>
-                                        </p:tgtEl>
-                                        <p:attrNameLst>
-                                          <p:attrName>style.visibility</p:attrName>
-                                        </p:attrNameLst>
-                                      </p:cBhvr>
-                                      <p:to>
-                                        <p:strVal val="visible"/>
-                                      </p:to>
-                                    </p:set>
-                                    <p:animEffect transition="in" filter="wheel(1)">
-                                      <p:cBhvr>
-                                        <p:cTn id="38" dur="500"/>
-                                        <p:tgtEl>
-                                          <p:spTgt spid="3">
-                                            <p:txEl>
-                                              <p:pRg st="10" end="10"/>
-                                            </p:txEl>
-                                          </p:spTgt>
-                                        </p:tgtEl>
-                                      </p:cBhvr>
-                                    </p:animEffect>
-                                  </p:childTnLst>
-                                </p:cTn>
-                              </p:par>
-                              <p:par>
-                                <p:cTn id="39" presetID="21" presetClass="entr" presetSubtype="1" fill="hold" grpId="0" nodeType="withEffect">
-                                  <p:stCondLst>
-                                    <p:cond delay="0"/>
-                                  </p:stCondLst>
-                                  <p:childTnLst>
-                                    <p:set>
-                                      <p:cBhvr>
-                                        <p:cTn id="40" dur="1" fill="hold">
-                                          <p:stCondLst>
-                                            <p:cond delay="0"/>
-                                          </p:stCondLst>
-                                        </p:cTn>
-                                        <p:tgtEl>
-                                          <p:spTgt spid="3">
-                                            <p:txEl>
-                                              <p:pRg st="12" end="12"/>
-                                            </p:txEl>
-                                          </p:spTgt>
-                                        </p:tgtEl>
-                                        <p:attrNameLst>
-                                          <p:attrName>style.visibility</p:attrName>
-                                        </p:attrNameLst>
-                                      </p:cBhvr>
-                                      <p:to>
-                                        <p:strVal val="visible"/>
-                                      </p:to>
-                                    </p:set>
-                                    <p:animEffect transition="in" filter="wheel(1)">
-                                      <p:cBhvr>
-                                        <p:cTn id="41" dur="500"/>
-                                        <p:tgtEl>
-                                          <p:spTgt spid="3">
-                                            <p:txEl>
-                                              <p:pRg st="12" end="12"/>
-                                            </p:txEl>
-                                          </p:spTgt>
-                                        </p:tgtEl>
-                                      </p:cBhvr>
-                                    </p:animEffect>
-                                  </p:childTnLst>
-                                </p:cTn>
-                              </p:par>
-                              <p:par>
-                                <p:cTn id="42" presetID="21" presetClass="entr" presetSubtype="1" fill="hold" grpId="0" nodeType="withEffect">
-                                  <p:stCondLst>
-                                    <p:cond delay="0"/>
-                                  </p:stCondLst>
-                                  <p:childTnLst>
-                                    <p:set>
-                                      <p:cBhvr>
-                                        <p:cTn id="43" dur="1" fill="hold">
-                                          <p:stCondLst>
-                                            <p:cond delay="0"/>
-                                          </p:stCondLst>
-                                        </p:cTn>
-                                        <p:tgtEl>
-                                          <p:spTgt spid="3">
-                                            <p:txEl>
-                                              <p:pRg st="13" end="13"/>
-                                            </p:txEl>
-                                          </p:spTgt>
-                                        </p:tgtEl>
-                                        <p:attrNameLst>
-                                          <p:attrName>style.visibility</p:attrName>
-                                        </p:attrNameLst>
-                                      </p:cBhvr>
-                                      <p:to>
-                                        <p:strVal val="visible"/>
-                                      </p:to>
-                                    </p:set>
-                                    <p:animEffect transition="in" filter="wheel(1)">
-                                      <p:cBhvr>
-                                        <p:cTn id="44" dur="500"/>
-                                        <p:tgtEl>
-                                          <p:spTgt spid="3">
-                                            <p:txEl>
-                                              <p:pRg st="13" end="13"/>
-                                            </p:txEl>
-                                          </p:spTgt>
-                                        </p:tgtEl>
-                                      </p:cBhvr>
-                                    </p:animEffect>
-                                  </p:childTnLst>
-                                </p:cTn>
-                              </p:par>
                             </p:childTnLst>
                           </p:cTn>
                         </p:par>
@@ -6269,7 +5356,7 @@
 </p:sld>
 </file>
 
-<file path=ppt/slides/slide5.xml><?xml version="1.0" encoding="utf-8"?>
+<file path=ppt/slides/slide4.xml><?xml version="1.0" encoding="utf-8"?>
 <p:sld xmlns:a="http://schemas.openxmlformats.org/drawingml/2006/main" xmlns:r="http://schemas.openxmlformats.org/officeDocument/2006/relationships" xmlns:p="http://schemas.openxmlformats.org/presentationml/2006/main">
   <p:cSld>
     <p:spTree>
@@ -6296,12 +5383,7 @@
             <p:ph type="title"/>
           </p:nvPr>
         </p:nvSpPr>
-        <p:spPr>
-          <a:xfrm>
-            <a:off x="457200" y="152400"/>
-            <a:ext cx="8229600" cy="762000"/>
-          </a:xfrm>
-        </p:spPr>
+        <p:spPr/>
         <p:txBody>
           <a:bodyPr>
             <a:normAutofit/>
@@ -6309,10 +5391,10 @@
           <a:lstStyle/>
           <a:p>
             <a:r>
-              <a:rPr lang="en-US" b="1" u="sng" dirty="0" smtClean="0"/>
-              <a:t>Summary</a:t>
-            </a:r>
-            <a:endParaRPr lang="en-US" b="1" u="sng" dirty="0"/>
+              <a:rPr lang="en-US" sz="4200" b="1" u="sng" dirty="0" smtClean="0"/>
+              <a:t>FUTURE FUNCTIONALITIES</a:t>
+            </a:r>
+            <a:endParaRPr lang="en-US" sz="4200" b="1" u="sng" dirty="0"/>
           </a:p>
         </p:txBody>
       </p:sp>
@@ -6326,885 +5408,51 @@
             <p:ph idx="1"/>
           </p:nvPr>
         </p:nvSpPr>
-        <p:spPr>
-          <a:xfrm>
-            <a:off x="457200" y="990600"/>
-            <a:ext cx="8229600" cy="5638800"/>
-          </a:xfrm>
-        </p:spPr>
+        <p:spPr/>
         <p:txBody>
           <a:bodyPr>
             <a:normAutofit/>
           </a:bodyPr>
           <a:lstStyle/>
           <a:p>
-            <a:r>
-              <a:rPr lang="en-US" sz="3000" u="sng" dirty="0" smtClean="0"/>
-              <a:t>Colors</a:t>
-            </a:r>
-            <a:r>
-              <a:rPr lang="en-US" sz="3000" dirty="0" smtClean="0"/>
-              <a:t>: This lets student get familiar with colors and know the different kinds of colors.</a:t>
-            </a:r>
-          </a:p>
-          <a:p>
-            <a:r>
-              <a:rPr lang="en-US" sz="3000" b="1" u="sng" dirty="0" smtClean="0"/>
-              <a:t>English</a:t>
-            </a:r>
-          </a:p>
-          <a:p>
-            <a:pPr lvl="1"/>
-            <a:r>
-              <a:rPr lang="en-US" sz="3000" u="sng" dirty="0" smtClean="0"/>
-              <a:t>Alphabets</a:t>
-            </a:r>
-            <a:r>
-              <a:rPr lang="en-US" sz="3000" dirty="0" smtClean="0"/>
-              <a:t>: This will display the English alphabets in a stylish manner that will attract pupils to read more about it.</a:t>
-            </a:r>
-          </a:p>
-          <a:p>
-            <a:pPr lvl="1"/>
-            <a:r>
-              <a:rPr lang="en-US" sz="3000" u="sng" dirty="0" smtClean="0"/>
-              <a:t>English Quiz</a:t>
-            </a:r>
-            <a:r>
-              <a:rPr lang="en-US" sz="3000" dirty="0" smtClean="0"/>
-              <a:t>: This will require students to study the English words and learn how to spell them offhand.</a:t>
-            </a:r>
-          </a:p>
-          <a:p>
-            <a:endParaRPr lang="en-US" sz="2800" dirty="0" smtClean="0"/>
-          </a:p>
-          <a:p>
-            <a:pPr lvl="1">
-              <a:buNone/>
+            <a:pPr marL="651510" indent="-514350">
+              <a:buFont typeface="Wingdings" pitchFamily="2" charset="2"/>
+              <a:buChar char="v"/>
             </a:pPr>
-            <a:endParaRPr lang="en-US" sz="2800" dirty="0" smtClean="0"/>
-          </a:p>
-          <a:p>
-            <a:pPr lvl="1">
-              <a:buNone/>
+            <a:r>
+              <a:rPr lang="en-US" b="1" u="sng" dirty="0" smtClean="0"/>
+              <a:t>Implement a payment plan</a:t>
+            </a:r>
+            <a:r>
+              <a:rPr lang="en-US" dirty="0" smtClean="0"/>
+              <a:t>: Users should be able make payment in order to have access to a particular module.</a:t>
+            </a:r>
+          </a:p>
+          <a:p>
+            <a:pPr marL="651510" indent="-514350">
+              <a:buAutoNum type="arabicPeriod"/>
             </a:pPr>
-            <a:endParaRPr lang="en-US" sz="2800" dirty="0" smtClean="0"/>
-          </a:p>
-          <a:p>
-            <a:pPr lvl="1">
-              <a:buNone/>
+            <a:endParaRPr lang="en-US" dirty="0" smtClean="0"/>
+          </a:p>
+          <a:p>
+            <a:pPr marL="651510" indent="-514350">
+              <a:buAutoNum type="arabicPeriod"/>
             </a:pPr>
-            <a:endParaRPr lang="en-US" sz="3000" dirty="0" smtClean="0"/>
-          </a:p>
-          <a:p>
-            <a:pPr lvl="1">
-              <a:buNone/>
+            <a:endParaRPr lang="en-US" dirty="0" smtClean="0"/>
+          </a:p>
+          <a:p>
+            <a:pPr marL="651510" indent="-514350">
+              <a:buFont typeface="Wingdings" pitchFamily="2" charset="2"/>
+              <a:buChar char="v"/>
             </a:pPr>
-            <a:endParaRPr lang="en-US" dirty="0"/>
-          </a:p>
-        </p:txBody>
-      </p:sp>
-    </p:spTree>
-  </p:cSld>
-  <p:clrMapOvr>
-    <a:masterClrMapping/>
-  </p:clrMapOvr>
-  <p:transition advClick="0" advTm="3000">
-    <p:wipe dir="r"/>
-  </p:transition>
-  <p:timing>
-    <p:tnLst>
-      <p:par>
-        <p:cTn id="1" dur="indefinite" restart="never" nodeType="tmRoot">
-          <p:childTnLst>
-            <p:seq concurrent="1" nextAc="seek">
-              <p:cTn id="2" dur="indefinite" nodeType="mainSeq">
-                <p:childTnLst>
-                  <p:par>
-                    <p:cTn id="3" fill="hold">
-                      <p:stCondLst>
-                        <p:cond delay="indefinite"/>
-                        <p:cond evt="onBegin" delay="0">
-                          <p:tn val="2"/>
-                        </p:cond>
-                      </p:stCondLst>
-                      <p:childTnLst>
-                        <p:par>
-                          <p:cTn id="4" fill="hold">
-                            <p:stCondLst>
-                              <p:cond delay="0"/>
-                            </p:stCondLst>
-                            <p:childTnLst>
-                              <p:par>
-                                <p:cTn id="5" presetID="10" presetClass="entr" presetSubtype="0" fill="hold" grpId="0" nodeType="afterEffect">
-                                  <p:stCondLst>
-                                    <p:cond delay="0"/>
-                                  </p:stCondLst>
-                                  <p:childTnLst>
-                                    <p:set>
-                                      <p:cBhvr>
-                                        <p:cTn id="6" dur="1" fill="hold">
-                                          <p:stCondLst>
-                                            <p:cond delay="0"/>
-                                          </p:stCondLst>
-                                        </p:cTn>
-                                        <p:tgtEl>
-                                          <p:spTgt spid="2"/>
-                                        </p:tgtEl>
-                                        <p:attrNameLst>
-                                          <p:attrName>style.visibility</p:attrName>
-                                        </p:attrNameLst>
-                                      </p:cBhvr>
-                                      <p:to>
-                                        <p:strVal val="visible"/>
-                                      </p:to>
-                                    </p:set>
-                                    <p:animEffect transition="in" filter="fade">
-                                      <p:cBhvr>
-                                        <p:cTn id="7" dur="500"/>
-                                        <p:tgtEl>
-                                          <p:spTgt spid="2"/>
-                                        </p:tgtEl>
-                                      </p:cBhvr>
-                                    </p:animEffect>
-                                  </p:childTnLst>
-                                </p:cTn>
-                              </p:par>
-                              <p:par>
-                                <p:cTn id="8" presetID="29" presetClass="entr" presetSubtype="0" fill="hold" grpId="0" nodeType="withEffect">
-                                  <p:stCondLst>
-                                    <p:cond delay="0"/>
-                                  </p:stCondLst>
-                                  <p:childTnLst>
-                                    <p:set>
-                                      <p:cBhvr>
-                                        <p:cTn id="9" dur="1" fill="hold">
-                                          <p:stCondLst>
-                                            <p:cond delay="0"/>
-                                          </p:stCondLst>
-                                        </p:cTn>
-                                        <p:tgtEl>
-                                          <p:spTgt spid="3">
-                                            <p:txEl>
-                                              <p:pRg st="0" end="0"/>
-                                            </p:txEl>
-                                          </p:spTgt>
-                                        </p:tgtEl>
-                                        <p:attrNameLst>
-                                          <p:attrName>style.visibility</p:attrName>
-                                        </p:attrNameLst>
-                                      </p:cBhvr>
-                                      <p:to>
-                                        <p:strVal val="visible"/>
-                                      </p:to>
-                                    </p:set>
-                                    <p:anim calcmode="lin" valueType="num">
-                                      <p:cBhvr>
-                                        <p:cTn id="10" dur="500" fill="hold"/>
-                                        <p:tgtEl>
-                                          <p:spTgt spid="3">
-                                            <p:txEl>
-                                              <p:pRg st="0" end="0"/>
-                                            </p:txEl>
-                                          </p:spTgt>
-                                        </p:tgtEl>
-                                        <p:attrNameLst>
-                                          <p:attrName>ppt_x</p:attrName>
-                                        </p:attrNameLst>
-                                      </p:cBhvr>
-                                      <p:tavLst>
-                                        <p:tav tm="0">
-                                          <p:val>
-                                            <p:strVal val="#ppt_x-.2"/>
-                                          </p:val>
-                                        </p:tav>
-                                        <p:tav tm="100000">
-                                          <p:val>
-                                            <p:strVal val="#ppt_x"/>
-                                          </p:val>
-                                        </p:tav>
-                                      </p:tavLst>
-                                    </p:anim>
-                                    <p:anim calcmode="lin" valueType="num">
-                                      <p:cBhvr>
-                                        <p:cTn id="11" dur="500" fill="hold"/>
-                                        <p:tgtEl>
-                                          <p:spTgt spid="3">
-                                            <p:txEl>
-                                              <p:pRg st="0" end="0"/>
-                                            </p:txEl>
-                                          </p:spTgt>
-                                        </p:tgtEl>
-                                        <p:attrNameLst>
-                                          <p:attrName>ppt_y</p:attrName>
-                                        </p:attrNameLst>
-                                      </p:cBhvr>
-                                      <p:tavLst>
-                                        <p:tav tm="0">
-                                          <p:val>
-                                            <p:strVal val="#ppt_y"/>
-                                          </p:val>
-                                        </p:tav>
-                                        <p:tav tm="100000">
-                                          <p:val>
-                                            <p:strVal val="#ppt_y"/>
-                                          </p:val>
-                                        </p:tav>
-                                      </p:tavLst>
-                                    </p:anim>
-                                    <p:animEffect transition="in" filter="wipe(right)" prLst="gradientSize: 0.1">
-                                      <p:cBhvr>
-                                        <p:cTn id="12" dur="500"/>
-                                        <p:tgtEl>
-                                          <p:spTgt spid="3">
-                                            <p:txEl>
-                                              <p:pRg st="0" end="0"/>
-                                            </p:txEl>
-                                          </p:spTgt>
-                                        </p:tgtEl>
-                                      </p:cBhvr>
-                                    </p:animEffect>
-                                  </p:childTnLst>
-                                </p:cTn>
-                              </p:par>
-                            </p:childTnLst>
-                          </p:cTn>
-                        </p:par>
-                      </p:childTnLst>
-                    </p:cTn>
-                  </p:par>
-                  <p:par>
-                    <p:cTn id="13" fill="hold">
-                      <p:stCondLst>
-                        <p:cond delay="indefinite"/>
-                      </p:stCondLst>
-                      <p:childTnLst>
-                        <p:par>
-                          <p:cTn id="14" fill="hold">
-                            <p:stCondLst>
-                              <p:cond delay="0"/>
-                            </p:stCondLst>
-                            <p:childTnLst>
-                              <p:par>
-                                <p:cTn id="15" presetID="29" presetClass="entr" presetSubtype="0" fill="hold" grpId="0" nodeType="clickEffect">
-                                  <p:stCondLst>
-                                    <p:cond delay="0"/>
-                                  </p:stCondLst>
-                                  <p:childTnLst>
-                                    <p:set>
-                                      <p:cBhvr>
-                                        <p:cTn id="16" dur="1" fill="hold">
-                                          <p:stCondLst>
-                                            <p:cond delay="0"/>
-                                          </p:stCondLst>
-                                        </p:cTn>
-                                        <p:tgtEl>
-                                          <p:spTgt spid="3">
-                                            <p:txEl>
-                                              <p:pRg st="1" end="1"/>
-                                            </p:txEl>
-                                          </p:spTgt>
-                                        </p:tgtEl>
-                                        <p:attrNameLst>
-                                          <p:attrName>style.visibility</p:attrName>
-                                        </p:attrNameLst>
-                                      </p:cBhvr>
-                                      <p:to>
-                                        <p:strVal val="visible"/>
-                                      </p:to>
-                                    </p:set>
-                                    <p:anim calcmode="lin" valueType="num">
-                                      <p:cBhvr>
-                                        <p:cTn id="17" dur="500" fill="hold"/>
-                                        <p:tgtEl>
-                                          <p:spTgt spid="3">
-                                            <p:txEl>
-                                              <p:pRg st="1" end="1"/>
-                                            </p:txEl>
-                                          </p:spTgt>
-                                        </p:tgtEl>
-                                        <p:attrNameLst>
-                                          <p:attrName>ppt_x</p:attrName>
-                                        </p:attrNameLst>
-                                      </p:cBhvr>
-                                      <p:tavLst>
-                                        <p:tav tm="0">
-                                          <p:val>
-                                            <p:strVal val="#ppt_x-.2"/>
-                                          </p:val>
-                                        </p:tav>
-                                        <p:tav tm="100000">
-                                          <p:val>
-                                            <p:strVal val="#ppt_x"/>
-                                          </p:val>
-                                        </p:tav>
-                                      </p:tavLst>
-                                    </p:anim>
-                                    <p:anim calcmode="lin" valueType="num">
-                                      <p:cBhvr>
-                                        <p:cTn id="18" dur="500" fill="hold"/>
-                                        <p:tgtEl>
-                                          <p:spTgt spid="3">
-                                            <p:txEl>
-                                              <p:pRg st="1" end="1"/>
-                                            </p:txEl>
-                                          </p:spTgt>
-                                        </p:tgtEl>
-                                        <p:attrNameLst>
-                                          <p:attrName>ppt_y</p:attrName>
-                                        </p:attrNameLst>
-                                      </p:cBhvr>
-                                      <p:tavLst>
-                                        <p:tav tm="0">
-                                          <p:val>
-                                            <p:strVal val="#ppt_y"/>
-                                          </p:val>
-                                        </p:tav>
-                                        <p:tav tm="100000">
-                                          <p:val>
-                                            <p:strVal val="#ppt_y"/>
-                                          </p:val>
-                                        </p:tav>
-                                      </p:tavLst>
-                                    </p:anim>
-                                    <p:animEffect transition="in" filter="wipe(right)" prLst="gradientSize: 0.1">
-                                      <p:cBhvr>
-                                        <p:cTn id="19" dur="500"/>
-                                        <p:tgtEl>
-                                          <p:spTgt spid="3">
-                                            <p:txEl>
-                                              <p:pRg st="1" end="1"/>
-                                            </p:txEl>
-                                          </p:spTgt>
-                                        </p:tgtEl>
-                                      </p:cBhvr>
-                                    </p:animEffect>
-                                  </p:childTnLst>
-                                </p:cTn>
-                              </p:par>
-                              <p:par>
-                                <p:cTn id="20" presetID="29" presetClass="entr" presetSubtype="0" fill="hold" grpId="0" nodeType="withEffect">
-                                  <p:stCondLst>
-                                    <p:cond delay="0"/>
-                                  </p:stCondLst>
-                                  <p:childTnLst>
-                                    <p:set>
-                                      <p:cBhvr>
-                                        <p:cTn id="21" dur="1" fill="hold">
-                                          <p:stCondLst>
-                                            <p:cond delay="0"/>
-                                          </p:stCondLst>
-                                        </p:cTn>
-                                        <p:tgtEl>
-                                          <p:spTgt spid="3">
-                                            <p:txEl>
-                                              <p:pRg st="2" end="2"/>
-                                            </p:txEl>
-                                          </p:spTgt>
-                                        </p:tgtEl>
-                                        <p:attrNameLst>
-                                          <p:attrName>style.visibility</p:attrName>
-                                        </p:attrNameLst>
-                                      </p:cBhvr>
-                                      <p:to>
-                                        <p:strVal val="visible"/>
-                                      </p:to>
-                                    </p:set>
-                                    <p:anim calcmode="lin" valueType="num">
-                                      <p:cBhvr>
-                                        <p:cTn id="22" dur="500" fill="hold"/>
-                                        <p:tgtEl>
-                                          <p:spTgt spid="3">
-                                            <p:txEl>
-                                              <p:pRg st="2" end="2"/>
-                                            </p:txEl>
-                                          </p:spTgt>
-                                        </p:tgtEl>
-                                        <p:attrNameLst>
-                                          <p:attrName>ppt_x</p:attrName>
-                                        </p:attrNameLst>
-                                      </p:cBhvr>
-                                      <p:tavLst>
-                                        <p:tav tm="0">
-                                          <p:val>
-                                            <p:strVal val="#ppt_x-.2"/>
-                                          </p:val>
-                                        </p:tav>
-                                        <p:tav tm="100000">
-                                          <p:val>
-                                            <p:strVal val="#ppt_x"/>
-                                          </p:val>
-                                        </p:tav>
-                                      </p:tavLst>
-                                    </p:anim>
-                                    <p:anim calcmode="lin" valueType="num">
-                                      <p:cBhvr>
-                                        <p:cTn id="23" dur="500" fill="hold"/>
-                                        <p:tgtEl>
-                                          <p:spTgt spid="3">
-                                            <p:txEl>
-                                              <p:pRg st="2" end="2"/>
-                                            </p:txEl>
-                                          </p:spTgt>
-                                        </p:tgtEl>
-                                        <p:attrNameLst>
-                                          <p:attrName>ppt_y</p:attrName>
-                                        </p:attrNameLst>
-                                      </p:cBhvr>
-                                      <p:tavLst>
-                                        <p:tav tm="0">
-                                          <p:val>
-                                            <p:strVal val="#ppt_y"/>
-                                          </p:val>
-                                        </p:tav>
-                                        <p:tav tm="100000">
-                                          <p:val>
-                                            <p:strVal val="#ppt_y"/>
-                                          </p:val>
-                                        </p:tav>
-                                      </p:tavLst>
-                                    </p:anim>
-                                    <p:animEffect transition="in" filter="wipe(right)" prLst="gradientSize: 0.1">
-                                      <p:cBhvr>
-                                        <p:cTn id="24" dur="500"/>
-                                        <p:tgtEl>
-                                          <p:spTgt spid="3">
-                                            <p:txEl>
-                                              <p:pRg st="2" end="2"/>
-                                            </p:txEl>
-                                          </p:spTgt>
-                                        </p:tgtEl>
-                                      </p:cBhvr>
-                                    </p:animEffect>
-                                  </p:childTnLst>
-                                </p:cTn>
-                              </p:par>
-                              <p:par>
-                                <p:cTn id="25" presetID="29" presetClass="entr" presetSubtype="0" fill="hold" grpId="0" nodeType="withEffect">
-                                  <p:stCondLst>
-                                    <p:cond delay="0"/>
-                                  </p:stCondLst>
-                                  <p:childTnLst>
-                                    <p:set>
-                                      <p:cBhvr>
-                                        <p:cTn id="26" dur="1" fill="hold">
-                                          <p:stCondLst>
-                                            <p:cond delay="0"/>
-                                          </p:stCondLst>
-                                        </p:cTn>
-                                        <p:tgtEl>
-                                          <p:spTgt spid="3">
-                                            <p:txEl>
-                                              <p:pRg st="3" end="3"/>
-                                            </p:txEl>
-                                          </p:spTgt>
-                                        </p:tgtEl>
-                                        <p:attrNameLst>
-                                          <p:attrName>style.visibility</p:attrName>
-                                        </p:attrNameLst>
-                                      </p:cBhvr>
-                                      <p:to>
-                                        <p:strVal val="visible"/>
-                                      </p:to>
-                                    </p:set>
-                                    <p:anim calcmode="lin" valueType="num">
-                                      <p:cBhvr>
-                                        <p:cTn id="27" dur="500" fill="hold"/>
-                                        <p:tgtEl>
-                                          <p:spTgt spid="3">
-                                            <p:txEl>
-                                              <p:pRg st="3" end="3"/>
-                                            </p:txEl>
-                                          </p:spTgt>
-                                        </p:tgtEl>
-                                        <p:attrNameLst>
-                                          <p:attrName>ppt_x</p:attrName>
-                                        </p:attrNameLst>
-                                      </p:cBhvr>
-                                      <p:tavLst>
-                                        <p:tav tm="0">
-                                          <p:val>
-                                            <p:strVal val="#ppt_x-.2"/>
-                                          </p:val>
-                                        </p:tav>
-                                        <p:tav tm="100000">
-                                          <p:val>
-                                            <p:strVal val="#ppt_x"/>
-                                          </p:val>
-                                        </p:tav>
-                                      </p:tavLst>
-                                    </p:anim>
-                                    <p:anim calcmode="lin" valueType="num">
-                                      <p:cBhvr>
-                                        <p:cTn id="28" dur="500" fill="hold"/>
-                                        <p:tgtEl>
-                                          <p:spTgt spid="3">
-                                            <p:txEl>
-                                              <p:pRg st="3" end="3"/>
-                                            </p:txEl>
-                                          </p:spTgt>
-                                        </p:tgtEl>
-                                        <p:attrNameLst>
-                                          <p:attrName>ppt_y</p:attrName>
-                                        </p:attrNameLst>
-                                      </p:cBhvr>
-                                      <p:tavLst>
-                                        <p:tav tm="0">
-                                          <p:val>
-                                            <p:strVal val="#ppt_y"/>
-                                          </p:val>
-                                        </p:tav>
-                                        <p:tav tm="100000">
-                                          <p:val>
-                                            <p:strVal val="#ppt_y"/>
-                                          </p:val>
-                                        </p:tav>
-                                      </p:tavLst>
-                                    </p:anim>
-                                    <p:animEffect transition="in" filter="wipe(right)" prLst="gradientSize: 0.1">
-                                      <p:cBhvr>
-                                        <p:cTn id="29" dur="500"/>
-                                        <p:tgtEl>
-                                          <p:spTgt spid="3">
-                                            <p:txEl>
-                                              <p:pRg st="3" end="3"/>
-                                            </p:txEl>
-                                          </p:spTgt>
-                                        </p:tgtEl>
-                                      </p:cBhvr>
-                                    </p:animEffect>
-                                  </p:childTnLst>
-                                </p:cTn>
-                              </p:par>
-                            </p:childTnLst>
-                          </p:cTn>
-                        </p:par>
-                      </p:childTnLst>
-                    </p:cTn>
-                  </p:par>
-                </p:childTnLst>
-              </p:cTn>
-              <p:prevCondLst>
-                <p:cond evt="onPrev" delay="0">
-                  <p:tgtEl>
-                    <p:sldTgt/>
-                  </p:tgtEl>
-                </p:cond>
-              </p:prevCondLst>
-              <p:nextCondLst>
-                <p:cond evt="onNext" delay="0">
-                  <p:tgtEl>
-                    <p:sldTgt/>
-                  </p:tgtEl>
-                </p:cond>
-              </p:nextCondLst>
-            </p:seq>
-          </p:childTnLst>
-        </p:cTn>
-      </p:par>
-    </p:tnLst>
-    <p:bldLst>
-      <p:bldP spid="2" grpId="0"/>
-      <p:bldP spid="3" grpId="0" build="p"/>
-    </p:bldLst>
-  </p:timing>
-</p:sld>
-</file>
-
-<file path=ppt/slides/slide6.xml><?xml version="1.0" encoding="utf-8"?>
-<p:sld xmlns:a="http://schemas.openxmlformats.org/drawingml/2006/main" xmlns:r="http://schemas.openxmlformats.org/officeDocument/2006/relationships" xmlns:p="http://schemas.openxmlformats.org/presentationml/2006/main">
-  <p:cSld>
-    <p:spTree>
-      <p:nvGrpSpPr>
-        <p:cNvPr id="1" name=""/>
-        <p:cNvGrpSpPr/>
-        <p:nvPr/>
-      </p:nvGrpSpPr>
-      <p:grpSpPr>
-        <a:xfrm>
-          <a:off x="0" y="0"/>
-          <a:ext cx="0" cy="0"/>
-          <a:chOff x="0" y="0"/>
-          <a:chExt cx="0" cy="0"/>
-        </a:xfrm>
-      </p:grpSpPr>
-      <p:sp>
-        <p:nvSpPr>
-          <p:cNvPr id="2" name="Title 1"/>
-          <p:cNvSpPr>
-            <a:spLocks noGrp="1"/>
-          </p:cNvSpPr>
-          <p:nvPr>
-            <p:ph type="title"/>
-          </p:nvPr>
-        </p:nvSpPr>
-        <p:spPr>
-          <a:xfrm>
-            <a:off x="457200" y="152400"/>
-            <a:ext cx="8229600" cy="685800"/>
-          </a:xfrm>
-        </p:spPr>
-        <p:txBody>
-          <a:bodyPr>
-            <a:normAutofit fontScale="90000"/>
-          </a:bodyPr>
-          <a:lstStyle/>
-          <a:p>
-            <a:r>
-              <a:rPr lang="en-US" u="sng" dirty="0" smtClean="0"/>
-              <a:t>Summary</a:t>
-            </a:r>
-            <a:endParaRPr lang="en-US" u="sng" dirty="0"/>
-          </a:p>
-        </p:txBody>
-      </p:sp>
-      <p:sp>
-        <p:nvSpPr>
-          <p:cNvPr id="3" name="Content Placeholder 2"/>
-          <p:cNvSpPr>
-            <a:spLocks noGrp="1"/>
-          </p:cNvSpPr>
-          <p:nvPr>
-            <p:ph idx="1"/>
-          </p:nvPr>
-        </p:nvSpPr>
-        <p:spPr>
-          <a:xfrm>
-            <a:off x="457200" y="838200"/>
-            <a:ext cx="8229600" cy="5715000"/>
-          </a:xfrm>
-        </p:spPr>
-        <p:txBody>
-          <a:bodyPr>
-            <a:normAutofit fontScale="92500" lnSpcReduction="10000"/>
-          </a:bodyPr>
-          <a:lstStyle/>
-          <a:p>
-            <a:r>
-              <a:rPr lang="en-US" sz="3000" b="1" u="sng" dirty="0" err="1" smtClean="0"/>
-              <a:t>Maths</a:t>
-            </a:r>
-            <a:endParaRPr lang="en-US" sz="3000" b="1" u="sng" dirty="0" smtClean="0"/>
-          </a:p>
-          <a:p>
-            <a:pPr lvl="2"/>
-            <a:r>
-              <a:rPr lang="en-US" sz="2600" u="sng" dirty="0" smtClean="0"/>
-              <a:t>Numbers</a:t>
-            </a:r>
-            <a:r>
-              <a:rPr lang="en-US" sz="2600" dirty="0" smtClean="0"/>
-              <a:t>: This will display the numbers in a stylish manner to attract pupils to get familiar with them.</a:t>
-            </a:r>
-          </a:p>
-          <a:p>
-            <a:pPr lvl="2"/>
-            <a:r>
-              <a:rPr lang="en-US" sz="2600" u="sng" dirty="0" smtClean="0"/>
-              <a:t>Arithmetic Operators</a:t>
-            </a:r>
-            <a:r>
-              <a:rPr lang="en-US" sz="2600" dirty="0" smtClean="0"/>
-              <a:t>: This will let students know more about the basic arithmetic operators i.e. (+, -, x, ÷).</a:t>
-            </a:r>
-            <a:endParaRPr lang="en-US" b="1" u="sng" dirty="0" smtClean="0"/>
-          </a:p>
-          <a:p>
-            <a:pPr lvl="2"/>
-            <a:r>
-              <a:rPr lang="en-US" sz="2800" u="sng" dirty="0" err="1" smtClean="0"/>
-              <a:t>Add&amp;Minus</a:t>
-            </a:r>
-            <a:r>
-              <a:rPr lang="en-US" sz="2800" dirty="0" smtClean="0"/>
-              <a:t>: This is more like a game which focuses more on addition and subtraction.</a:t>
-            </a:r>
-          </a:p>
-          <a:p>
-            <a:pPr lvl="2"/>
-            <a:r>
-              <a:rPr lang="en-US" sz="2800" u="sng" dirty="0" err="1" smtClean="0"/>
-              <a:t>Times&amp;Divide</a:t>
-            </a:r>
-            <a:r>
-              <a:rPr lang="en-US" sz="2800" dirty="0" smtClean="0"/>
-              <a:t>: This is more like a game which focuses more on multiplication and division.</a:t>
-            </a:r>
-          </a:p>
-          <a:p>
-            <a:pPr lvl="2">
-              <a:buNone/>
-            </a:pPr>
-            <a:endParaRPr lang="en-US" sz="2800" dirty="0" smtClean="0"/>
-          </a:p>
-          <a:p>
-            <a:r>
-              <a:rPr lang="en-US" sz="3600" u="sng" dirty="0" smtClean="0"/>
-              <a:t>Calculator</a:t>
-            </a:r>
-            <a:r>
-              <a:rPr lang="en-US" sz="3600" dirty="0" smtClean="0"/>
-              <a:t>: This is a standard calculator used for basic calculations.</a:t>
-            </a:r>
-          </a:p>
-          <a:p>
-            <a:endParaRPr lang="en-US" sz="3400" u="sng" dirty="0" smtClean="0"/>
-          </a:p>
-          <a:p>
-            <a:endParaRPr lang="en-US" dirty="0"/>
-          </a:p>
-        </p:txBody>
-      </p:sp>
-    </p:spTree>
-  </p:cSld>
-  <p:clrMapOvr>
-    <a:masterClrMapping/>
-  </p:clrMapOvr>
-  <p:transition spd="slow" advClick="0" advTm="3000">
-    <p:wedge/>
-  </p:transition>
-  <p:timing>
-    <p:tnLst>
-      <p:par>
-        <p:cTn id="1" dur="indefinite" restart="never" nodeType="tmRoot"/>
-      </p:par>
-    </p:tnLst>
-  </p:timing>
-</p:sld>
-</file>
-
-<file path=ppt/slides/slide7.xml><?xml version="1.0" encoding="utf-8"?>
-<p:sld xmlns:a="http://schemas.openxmlformats.org/drawingml/2006/main" xmlns:r="http://schemas.openxmlformats.org/officeDocument/2006/relationships" xmlns:p="http://schemas.openxmlformats.org/presentationml/2006/main">
-  <p:cSld>
-    <p:spTree>
-      <p:nvGrpSpPr>
-        <p:cNvPr id="1" name=""/>
-        <p:cNvGrpSpPr/>
-        <p:nvPr/>
-      </p:nvGrpSpPr>
-      <p:grpSpPr>
-        <a:xfrm>
-          <a:off x="0" y="0"/>
-          <a:ext cx="0" cy="0"/>
-          <a:chOff x="0" y="0"/>
-          <a:chExt cx="0" cy="0"/>
-        </a:xfrm>
-      </p:grpSpPr>
-      <p:sp>
-        <p:nvSpPr>
-          <p:cNvPr id="2" name="Title 1"/>
-          <p:cNvSpPr>
-            <a:spLocks noGrp="1"/>
-          </p:cNvSpPr>
-          <p:nvPr>
-            <p:ph type="title"/>
-          </p:nvPr>
-        </p:nvSpPr>
-        <p:spPr/>
-        <p:txBody>
-          <a:bodyPr>
-            <a:normAutofit/>
-          </a:bodyPr>
-          <a:lstStyle/>
-          <a:p>
-            <a:r>
-              <a:rPr lang="en-US" sz="4200" b="1" u="sng" dirty="0" smtClean="0"/>
-              <a:t>My Contact Details</a:t>
-            </a:r>
-            <a:endParaRPr lang="en-US" sz="4200" b="1" u="sng" dirty="0"/>
-          </a:p>
-        </p:txBody>
-      </p:sp>
-      <p:sp>
-        <p:nvSpPr>
-          <p:cNvPr id="3" name="Content Placeholder 2"/>
-          <p:cNvSpPr>
-            <a:spLocks noGrp="1"/>
-          </p:cNvSpPr>
-          <p:nvPr>
-            <p:ph idx="1"/>
-          </p:nvPr>
-        </p:nvSpPr>
-        <p:spPr/>
-        <p:txBody>
-          <a:bodyPr>
-            <a:normAutofit/>
-          </a:bodyPr>
-          <a:lstStyle/>
-          <a:p>
-            <a:r>
-              <a:rPr lang="en-US" sz="3600" b="1" u="sng" dirty="0" smtClean="0"/>
-              <a:t>Phone</a:t>
-            </a:r>
-            <a:r>
-              <a:rPr lang="en-US" sz="3600" dirty="0" smtClean="0"/>
-              <a:t>: 08084833968, 08163282411</a:t>
-            </a:r>
-          </a:p>
-          <a:p>
-            <a:r>
-              <a:rPr lang="en-US" sz="3600" b="1" u="sng" dirty="0" smtClean="0"/>
-              <a:t>Github</a:t>
-            </a:r>
-            <a:r>
-              <a:rPr lang="en-US" sz="3600" dirty="0" smtClean="0"/>
-              <a:t>: kazmanbanj</a:t>
-            </a:r>
-          </a:p>
-          <a:p>
-            <a:r>
-              <a:rPr lang="en-US" sz="3600" b="1" u="sng" dirty="0" smtClean="0"/>
-              <a:t>Gmail</a:t>
-            </a:r>
-            <a:r>
-              <a:rPr lang="en-US" sz="3600" dirty="0" smtClean="0"/>
-              <a:t>: banjoko10@gmail.com</a:t>
-            </a:r>
-          </a:p>
-          <a:p>
-            <a:r>
-              <a:rPr lang="en-US" sz="3600" b="1" u="sng" dirty="0" smtClean="0"/>
-              <a:t>LinkedIn</a:t>
-            </a:r>
-            <a:r>
-              <a:rPr lang="en-US" sz="3600" dirty="0" smtClean="0"/>
-              <a:t>: Kazeem Banjoko</a:t>
-            </a:r>
-          </a:p>
-          <a:p>
-            <a:r>
-              <a:rPr lang="en-US" sz="3600" b="1" u="sng" dirty="0" smtClean="0"/>
-              <a:t>Medium</a:t>
-            </a:r>
-            <a:r>
-              <a:rPr lang="en-US" sz="3600" dirty="0" smtClean="0"/>
-              <a:t>: Banjoko Kazeem</a:t>
-            </a:r>
-          </a:p>
-          <a:p>
-            <a:r>
-              <a:rPr lang="en-US" sz="3600" b="1" u="sng" dirty="0" smtClean="0"/>
-              <a:t>Facebook</a:t>
-            </a:r>
-            <a:r>
-              <a:rPr lang="en-US" sz="3600" dirty="0" smtClean="0"/>
-              <a:t>: Kazman Banjoko</a:t>
-            </a:r>
-          </a:p>
-          <a:p>
-            <a:r>
-              <a:rPr lang="en-US" sz="3600" b="1" u="sng" dirty="0" smtClean="0"/>
-              <a:t>Twitter</a:t>
-            </a:r>
-            <a:r>
-              <a:rPr lang="en-US" sz="3600" dirty="0" smtClean="0"/>
-              <a:t>: kazmanbanjoko</a:t>
-            </a:r>
-          </a:p>
-          <a:p>
-            <a:pPr>
-              <a:buNone/>
-            </a:pPr>
+            <a:r>
+              <a:rPr lang="en-US" b="1" u="sng" dirty="0" smtClean="0"/>
+              <a:t>Integration of sound functionality</a:t>
+            </a:r>
+            <a:r>
+              <a:rPr lang="en-US" dirty="0" smtClean="0"/>
+              <a:t>: Users should be able to know the sound of each letters and numbers in the Alphabets and Numbers modules.</a:t>
+            </a:r>
             <a:endParaRPr lang="en-US" dirty="0"/>
           </a:p>
         </p:txBody>
@@ -7615,209 +5863,33 @@
                                   </p:childTnLst>
                                 </p:cTn>
                               </p:par>
+                            </p:childTnLst>
+                          </p:cTn>
+                        </p:par>
+                      </p:childTnLst>
+                    </p:cTn>
+                  </p:par>
+                  <p:par>
+                    <p:cTn id="26" fill="hold">
+                      <p:stCondLst>
+                        <p:cond delay="indefinite"/>
+                      </p:stCondLst>
+                      <p:childTnLst>
+                        <p:par>
+                          <p:cTn id="27" fill="hold">
+                            <p:stCondLst>
+                              <p:cond delay="0"/>
+                            </p:stCondLst>
+                            <p:childTnLst>
                               <p:par>
-                                <p:cTn id="26" presetID="47" presetClass="entr" presetSubtype="0" fill="hold" grpId="0" nodeType="withEffect">
+                                <p:cTn id="28" presetID="47" presetClass="entr" presetSubtype="0" fill="hold" grpId="0" nodeType="clickEffect">
                                   <p:stCondLst>
                                     <p:cond delay="0"/>
                                   </p:stCondLst>
                                   <p:childTnLst>
                                     <p:set>
                                       <p:cBhvr>
-                                        <p:cTn id="27" dur="1" fill="hold">
-                                          <p:stCondLst>
-                                            <p:cond delay="0"/>
-                                          </p:stCondLst>
-                                        </p:cTn>
-                                        <p:tgtEl>
-                                          <p:spTgt spid="3">
-                                            <p:txEl>
-                                              <p:pRg st="1" end="1"/>
-                                            </p:txEl>
-                                          </p:spTgt>
-                                        </p:tgtEl>
-                                        <p:attrNameLst>
-                                          <p:attrName>style.visibility</p:attrName>
-                                        </p:attrNameLst>
-                                      </p:cBhvr>
-                                      <p:to>
-                                        <p:strVal val="visible"/>
-                                      </p:to>
-                                    </p:set>
-                                    <p:animEffect transition="in" filter="fade">
-                                      <p:cBhvr>
-                                        <p:cTn id="28" dur="500"/>
-                                        <p:tgtEl>
-                                          <p:spTgt spid="3">
-                                            <p:txEl>
-                                              <p:pRg st="1" end="1"/>
-                                            </p:txEl>
-                                          </p:spTgt>
-                                        </p:tgtEl>
-                                      </p:cBhvr>
-                                    </p:animEffect>
-                                    <p:anim calcmode="lin" valueType="num">
-                                      <p:cBhvr>
-                                        <p:cTn id="29" dur="500" fill="hold"/>
-                                        <p:tgtEl>
-                                          <p:spTgt spid="3">
-                                            <p:txEl>
-                                              <p:pRg st="1" end="1"/>
-                                            </p:txEl>
-                                          </p:spTgt>
-                                        </p:tgtEl>
-                                        <p:attrNameLst>
-                                          <p:attrName>ppt_x</p:attrName>
-                                        </p:attrNameLst>
-                                      </p:cBhvr>
-                                      <p:tavLst>
-                                        <p:tav tm="0">
-                                          <p:val>
-                                            <p:strVal val="#ppt_x"/>
-                                          </p:val>
-                                        </p:tav>
-                                        <p:tav tm="100000">
-                                          <p:val>
-                                            <p:strVal val="#ppt_x"/>
-                                          </p:val>
-                                        </p:tav>
-                                      </p:tavLst>
-                                    </p:anim>
-                                    <p:anim calcmode="lin" valueType="num">
-                                      <p:cBhvr>
-                                        <p:cTn id="30" dur="500" fill="hold"/>
-                                        <p:tgtEl>
-                                          <p:spTgt spid="3">
-                                            <p:txEl>
-                                              <p:pRg st="1" end="1"/>
-                                            </p:txEl>
-                                          </p:spTgt>
-                                        </p:tgtEl>
-                                        <p:attrNameLst>
-                                          <p:attrName>ppt_y</p:attrName>
-                                        </p:attrNameLst>
-                                      </p:cBhvr>
-                                      <p:tavLst>
-                                        <p:tav tm="0">
-                                          <p:val>
-                                            <p:strVal val="#ppt_y-.1"/>
-                                          </p:val>
-                                        </p:tav>
-                                        <p:tav tm="100000">
-                                          <p:val>
-                                            <p:strVal val="#ppt_y"/>
-                                          </p:val>
-                                        </p:tav>
-                                      </p:tavLst>
-                                    </p:anim>
-                                  </p:childTnLst>
-                                </p:cTn>
-                              </p:par>
-                              <p:par>
-                                <p:cTn id="31" presetID="47" presetClass="entr" presetSubtype="0" fill="hold" grpId="0" nodeType="withEffect">
-                                  <p:stCondLst>
-                                    <p:cond delay="0"/>
-                                  </p:stCondLst>
-                                  <p:childTnLst>
-                                    <p:set>
-                                      <p:cBhvr>
-                                        <p:cTn id="32" dur="1" fill="hold">
-                                          <p:stCondLst>
-                                            <p:cond delay="0"/>
-                                          </p:stCondLst>
-                                        </p:cTn>
-                                        <p:tgtEl>
-                                          <p:spTgt spid="3">
-                                            <p:txEl>
-                                              <p:pRg st="2" end="2"/>
-                                            </p:txEl>
-                                          </p:spTgt>
-                                        </p:tgtEl>
-                                        <p:attrNameLst>
-                                          <p:attrName>style.visibility</p:attrName>
-                                        </p:attrNameLst>
-                                      </p:cBhvr>
-                                      <p:to>
-                                        <p:strVal val="visible"/>
-                                      </p:to>
-                                    </p:set>
-                                    <p:animEffect transition="in" filter="fade">
-                                      <p:cBhvr>
-                                        <p:cTn id="33" dur="500"/>
-                                        <p:tgtEl>
-                                          <p:spTgt spid="3">
-                                            <p:txEl>
-                                              <p:pRg st="2" end="2"/>
-                                            </p:txEl>
-                                          </p:spTgt>
-                                        </p:tgtEl>
-                                      </p:cBhvr>
-                                    </p:animEffect>
-                                    <p:anim calcmode="lin" valueType="num">
-                                      <p:cBhvr>
-                                        <p:cTn id="34" dur="500" fill="hold"/>
-                                        <p:tgtEl>
-                                          <p:spTgt spid="3">
-                                            <p:txEl>
-                                              <p:pRg st="2" end="2"/>
-                                            </p:txEl>
-                                          </p:spTgt>
-                                        </p:tgtEl>
-                                        <p:attrNameLst>
-                                          <p:attrName>ppt_x</p:attrName>
-                                        </p:attrNameLst>
-                                      </p:cBhvr>
-                                      <p:tavLst>
-                                        <p:tav tm="0">
-                                          <p:val>
-                                            <p:strVal val="#ppt_x"/>
-                                          </p:val>
-                                        </p:tav>
-                                        <p:tav tm="100000">
-                                          <p:val>
-                                            <p:strVal val="#ppt_x"/>
-                                          </p:val>
-                                        </p:tav>
-                                      </p:tavLst>
-                                    </p:anim>
-                                    <p:anim calcmode="lin" valueType="num">
-                                      <p:cBhvr>
-                                        <p:cTn id="35" dur="500" fill="hold"/>
-                                        <p:tgtEl>
-                                          <p:spTgt spid="3">
-                                            <p:txEl>
-                                              <p:pRg st="2" end="2"/>
-                                            </p:txEl>
-                                          </p:spTgt>
-                                        </p:tgtEl>
-                                        <p:attrNameLst>
-                                          <p:attrName>ppt_y</p:attrName>
-                                        </p:attrNameLst>
-                                      </p:cBhvr>
-                                      <p:tavLst>
-                                        <p:tav tm="0">
-                                          <p:val>
-                                            <p:strVal val="#ppt_y-.1"/>
-                                          </p:val>
-                                        </p:tav>
-                                        <p:tav tm="100000">
-                                          <p:val>
-                                            <p:strVal val="#ppt_y"/>
-                                          </p:val>
-                                        </p:tav>
-                                      </p:tavLst>
-                                    </p:anim>
-                                  </p:childTnLst>
-                                </p:cTn>
-                              </p:par>
-                              <p:par>
-                                <p:cTn id="36" presetID="47" presetClass="entr" presetSubtype="0" fill="hold" grpId="0" nodeType="withEffect">
-                                  <p:stCondLst>
-                                    <p:cond delay="0"/>
-                                  </p:stCondLst>
-                                  <p:childTnLst>
-                                    <p:set>
-                                      <p:cBhvr>
-                                        <p:cTn id="37" dur="1" fill="hold">
+                                        <p:cTn id="29" dur="1" fill="hold">
                                           <p:stCondLst>
                                             <p:cond delay="0"/>
                                           </p:stCondLst>
@@ -7839,7 +5911,7 @@
                                     </p:set>
                                     <p:animEffect transition="in" filter="fade">
                                       <p:cBhvr>
-                                        <p:cTn id="38" dur="500"/>
+                                        <p:cTn id="30" dur="500"/>
                                         <p:tgtEl>
                                           <p:spTgt spid="3">
                                             <p:txEl>
@@ -7851,7 +5923,7 @@
                                     </p:animEffect>
                                     <p:anim calcmode="lin" valueType="num">
                                       <p:cBhvr>
-                                        <p:cTn id="39" dur="500" fill="hold"/>
+                                        <p:cTn id="31" dur="500" fill="hold"/>
                                         <p:tgtEl>
                                           <p:spTgt spid="3">
                                             <p:txEl>
@@ -7878,302 +5950,11 @@
                                     </p:anim>
                                     <p:anim calcmode="lin" valueType="num">
                                       <p:cBhvr>
-                                        <p:cTn id="40" dur="500" fill="hold"/>
+                                        <p:cTn id="32" dur="500" fill="hold"/>
                                         <p:tgtEl>
                                           <p:spTgt spid="3">
                                             <p:txEl>
                                               <p:pRg st="3" end="3"/>
-                                            </p:txEl>
-                                          </p:spTgt>
-                                        </p:tgtEl>
-                                        <p:attrNameLst>
-                                          <p:attrName>ppt_y</p:attrName>
-                                        </p:attrNameLst>
-                                      </p:cBhvr>
-                                      <p:tavLst>
-                                        <p:tav tm="0">
-                                          <p:val>
-                                            <p:strVal val="#ppt_y-.1"/>
-                                          </p:val>
-                                        </p:tav>
-                                        <p:tav tm="100000">
-                                          <p:val>
-                                            <p:strVal val="#ppt_y"/>
-                                          </p:val>
-                                        </p:tav>
-                                      </p:tavLst>
-                                    </p:anim>
-                                  </p:childTnLst>
-                                </p:cTn>
-                              </p:par>
-                              <p:par>
-                                <p:cTn id="41" presetID="47" presetClass="entr" presetSubtype="0" fill="hold" grpId="0" nodeType="withEffect">
-                                  <p:stCondLst>
-                                    <p:cond delay="0"/>
-                                  </p:stCondLst>
-                                  <p:childTnLst>
-                                    <p:set>
-                                      <p:cBhvr>
-                                        <p:cTn id="42" dur="1" fill="hold">
-                                          <p:stCondLst>
-                                            <p:cond delay="0"/>
-                                          </p:stCondLst>
-                                        </p:cTn>
-                                        <p:tgtEl>
-                                          <p:spTgt spid="3">
-                                            <p:txEl>
-                                              <p:pRg st="4" end="4"/>
-                                            </p:txEl>
-                                          </p:spTgt>
-                                        </p:tgtEl>
-                                        <p:attrNameLst>
-                                          <p:attrName>style.visibility</p:attrName>
-                                        </p:attrNameLst>
-                                      </p:cBhvr>
-                                      <p:to>
-                                        <p:strVal val="visible"/>
-                                      </p:to>
-                                    </p:set>
-                                    <p:animEffect transition="in" filter="fade">
-                                      <p:cBhvr>
-                                        <p:cTn id="43" dur="500"/>
-                                        <p:tgtEl>
-                                          <p:spTgt spid="3">
-                                            <p:txEl>
-                                              <p:pRg st="4" end="4"/>
-                                            </p:txEl>
-                                          </p:spTgt>
-                                        </p:tgtEl>
-                                      </p:cBhvr>
-                                    </p:animEffect>
-                                    <p:anim calcmode="lin" valueType="num">
-                                      <p:cBhvr>
-                                        <p:cTn id="44" dur="500" fill="hold"/>
-                                        <p:tgtEl>
-                                          <p:spTgt spid="3">
-                                            <p:txEl>
-                                              <p:pRg st="4" end="4"/>
-                                            </p:txEl>
-                                          </p:spTgt>
-                                        </p:tgtEl>
-                                        <p:attrNameLst>
-                                          <p:attrName>ppt_x</p:attrName>
-                                        </p:attrNameLst>
-                                      </p:cBhvr>
-                                      <p:tavLst>
-                                        <p:tav tm="0">
-                                          <p:val>
-                                            <p:strVal val="#ppt_x"/>
-                                          </p:val>
-                                        </p:tav>
-                                        <p:tav tm="100000">
-                                          <p:val>
-                                            <p:strVal val="#ppt_x"/>
-                                          </p:val>
-                                        </p:tav>
-                                      </p:tavLst>
-                                    </p:anim>
-                                    <p:anim calcmode="lin" valueType="num">
-                                      <p:cBhvr>
-                                        <p:cTn id="45" dur="500" fill="hold"/>
-                                        <p:tgtEl>
-                                          <p:spTgt spid="3">
-                                            <p:txEl>
-                                              <p:pRg st="4" end="4"/>
-                                            </p:txEl>
-                                          </p:spTgt>
-                                        </p:tgtEl>
-                                        <p:attrNameLst>
-                                          <p:attrName>ppt_y</p:attrName>
-                                        </p:attrNameLst>
-                                      </p:cBhvr>
-                                      <p:tavLst>
-                                        <p:tav tm="0">
-                                          <p:val>
-                                            <p:strVal val="#ppt_y-.1"/>
-                                          </p:val>
-                                        </p:tav>
-                                        <p:tav tm="100000">
-                                          <p:val>
-                                            <p:strVal val="#ppt_y"/>
-                                          </p:val>
-                                        </p:tav>
-                                      </p:tavLst>
-                                    </p:anim>
-                                  </p:childTnLst>
-                                </p:cTn>
-                              </p:par>
-                              <p:par>
-                                <p:cTn id="46" presetID="47" presetClass="entr" presetSubtype="0" fill="hold" grpId="0" nodeType="withEffect">
-                                  <p:stCondLst>
-                                    <p:cond delay="0"/>
-                                  </p:stCondLst>
-                                  <p:childTnLst>
-                                    <p:set>
-                                      <p:cBhvr>
-                                        <p:cTn id="47" dur="1" fill="hold">
-                                          <p:stCondLst>
-                                            <p:cond delay="0"/>
-                                          </p:stCondLst>
-                                        </p:cTn>
-                                        <p:tgtEl>
-                                          <p:spTgt spid="3">
-                                            <p:txEl>
-                                              <p:pRg st="5" end="5"/>
-                                            </p:txEl>
-                                          </p:spTgt>
-                                        </p:tgtEl>
-                                        <p:attrNameLst>
-                                          <p:attrName>style.visibility</p:attrName>
-                                        </p:attrNameLst>
-                                      </p:cBhvr>
-                                      <p:to>
-                                        <p:strVal val="visible"/>
-                                      </p:to>
-                                    </p:set>
-                                    <p:animEffect transition="in" filter="fade">
-                                      <p:cBhvr>
-                                        <p:cTn id="48" dur="500"/>
-                                        <p:tgtEl>
-                                          <p:spTgt spid="3">
-                                            <p:txEl>
-                                              <p:pRg st="5" end="5"/>
-                                            </p:txEl>
-                                          </p:spTgt>
-                                        </p:tgtEl>
-                                      </p:cBhvr>
-                                    </p:animEffect>
-                                    <p:anim calcmode="lin" valueType="num">
-                                      <p:cBhvr>
-                                        <p:cTn id="49" dur="500" fill="hold"/>
-                                        <p:tgtEl>
-                                          <p:spTgt spid="3">
-                                            <p:txEl>
-                                              <p:pRg st="5" end="5"/>
-                                            </p:txEl>
-                                          </p:spTgt>
-                                        </p:tgtEl>
-                                        <p:attrNameLst>
-                                          <p:attrName>ppt_x</p:attrName>
-                                        </p:attrNameLst>
-                                      </p:cBhvr>
-                                      <p:tavLst>
-                                        <p:tav tm="0">
-                                          <p:val>
-                                            <p:strVal val="#ppt_x"/>
-                                          </p:val>
-                                        </p:tav>
-                                        <p:tav tm="100000">
-                                          <p:val>
-                                            <p:strVal val="#ppt_x"/>
-                                          </p:val>
-                                        </p:tav>
-                                      </p:tavLst>
-                                    </p:anim>
-                                    <p:anim calcmode="lin" valueType="num">
-                                      <p:cBhvr>
-                                        <p:cTn id="50" dur="500" fill="hold"/>
-                                        <p:tgtEl>
-                                          <p:spTgt spid="3">
-                                            <p:txEl>
-                                              <p:pRg st="5" end="5"/>
-                                            </p:txEl>
-                                          </p:spTgt>
-                                        </p:tgtEl>
-                                        <p:attrNameLst>
-                                          <p:attrName>ppt_y</p:attrName>
-                                        </p:attrNameLst>
-                                      </p:cBhvr>
-                                      <p:tavLst>
-                                        <p:tav tm="0">
-                                          <p:val>
-                                            <p:strVal val="#ppt_y-.1"/>
-                                          </p:val>
-                                        </p:tav>
-                                        <p:tav tm="100000">
-                                          <p:val>
-                                            <p:strVal val="#ppt_y"/>
-                                          </p:val>
-                                        </p:tav>
-                                      </p:tavLst>
-                                    </p:anim>
-                                  </p:childTnLst>
-                                </p:cTn>
-                              </p:par>
-                              <p:par>
-                                <p:cTn id="51" presetID="47" presetClass="entr" presetSubtype="0" fill="hold" grpId="0" nodeType="withEffect">
-                                  <p:stCondLst>
-                                    <p:cond delay="0"/>
-                                  </p:stCondLst>
-                                  <p:childTnLst>
-                                    <p:set>
-                                      <p:cBhvr>
-                                        <p:cTn id="52" dur="1" fill="hold">
-                                          <p:stCondLst>
-                                            <p:cond delay="0"/>
-                                          </p:stCondLst>
-                                        </p:cTn>
-                                        <p:tgtEl>
-                                          <p:spTgt spid="3">
-                                            <p:txEl>
-                                              <p:pRg st="6" end="6"/>
-                                            </p:txEl>
-                                          </p:spTgt>
-                                        </p:tgtEl>
-                                        <p:attrNameLst>
-                                          <p:attrName>style.visibility</p:attrName>
-                                        </p:attrNameLst>
-                                      </p:cBhvr>
-                                      <p:to>
-                                        <p:strVal val="visible"/>
-                                      </p:to>
-                                    </p:set>
-                                    <p:animEffect transition="in" filter="fade">
-                                      <p:cBhvr>
-                                        <p:cTn id="53" dur="500"/>
-                                        <p:tgtEl>
-                                          <p:spTgt spid="3">
-                                            <p:txEl>
-                                              <p:pRg st="6" end="6"/>
-                                            </p:txEl>
-                                          </p:spTgt>
-                                        </p:tgtEl>
-                                      </p:cBhvr>
-                                    </p:animEffect>
-                                    <p:anim calcmode="lin" valueType="num">
-                                      <p:cBhvr>
-                                        <p:cTn id="54" dur="500" fill="hold"/>
-                                        <p:tgtEl>
-                                          <p:spTgt spid="3">
-                                            <p:txEl>
-                                              <p:pRg st="6" end="6"/>
-                                            </p:txEl>
-                                          </p:spTgt>
-                                        </p:tgtEl>
-                                        <p:attrNameLst>
-                                          <p:attrName>ppt_x</p:attrName>
-                                        </p:attrNameLst>
-                                      </p:cBhvr>
-                                      <p:tavLst>
-                                        <p:tav tm="0">
-                                          <p:val>
-                                            <p:strVal val="#ppt_x"/>
-                                          </p:val>
-                                        </p:tav>
-                                        <p:tav tm="100000">
-                                          <p:val>
-                                            <p:strVal val="#ppt_x"/>
-                                          </p:val>
-                                        </p:tav>
-                                      </p:tavLst>
-                                    </p:anim>
-                                    <p:anim calcmode="lin" valueType="num">
-                                      <p:cBhvr>
-                                        <p:cTn id="55" dur="500" fill="hold"/>
-                                        <p:tgtEl>
-                                          <p:spTgt spid="3">
-                                            <p:txEl>
-                                              <p:pRg st="6" end="6"/>
                                             </p:txEl>
                                           </p:spTgt>
                                         </p:tgtEl>

</xml_diff>